<commit_message>
a részem majdnem kész, holnap polish
</commit_message>
<xml_diff>
--- a/gál része.pptx
+++ b/gál része.pptx
@@ -8,19 +8,20 @@
     <p:sldMasterId id="2147483710" r:id="rId4"/>
   </p:sldMasterIdLst>
   <p:notesMasterIdLst>
-    <p:notesMasterId r:id="rId12"/>
+    <p:notesMasterId r:id="rId13"/>
   </p:notesMasterIdLst>
   <p:handoutMasterIdLst>
-    <p:handoutMasterId r:id="rId13"/>
+    <p:handoutMasterId r:id="rId14"/>
   </p:handoutMasterIdLst>
   <p:sldIdLst>
-    <p:sldId id="275" r:id="rId5"/>
-    <p:sldId id="276" r:id="rId6"/>
+    <p:sldId id="282" r:id="rId5"/>
+    <p:sldId id="275" r:id="rId6"/>
     <p:sldId id="277" r:id="rId7"/>
-    <p:sldId id="278" r:id="rId8"/>
-    <p:sldId id="281" r:id="rId9"/>
-    <p:sldId id="279" r:id="rId10"/>
-    <p:sldId id="280" r:id="rId11"/>
+    <p:sldId id="276" r:id="rId8"/>
+    <p:sldId id="280" r:id="rId9"/>
+    <p:sldId id="278" r:id="rId10"/>
+    <p:sldId id="281" r:id="rId11"/>
+    <p:sldId id="283" r:id="rId12"/>
   </p:sldIdLst>
   <p:sldSz cx="12192000" cy="6858000"/>
   <p:notesSz cx="6858000" cy="9144000"/>
@@ -258,13 +259,14 @@
       <p14:sectionLst xmlns:p14="http://schemas.microsoft.com/office/powerpoint/2010/main">
         <p14:section name="Gálati" id="{5F56BCDF-E033-43DF-A4D1-C67168D77E7D}">
           <p14:sldIdLst>
+            <p14:sldId id="282"/>
             <p14:sldId id="275"/>
+            <p14:sldId id="277"/>
             <p14:sldId id="276"/>
-            <p14:sldId id="277"/>
+            <p14:sldId id="280"/>
             <p14:sldId id="278"/>
             <p14:sldId id="281"/>
-            <p14:sldId id="279"/>
-            <p14:sldId id="280"/>
+            <p14:sldId id="283"/>
           </p14:sldIdLst>
         </p14:section>
       </p14:sectionLst>
@@ -384,7 +386,7 @@
           <a:p>
             <a:fld id="{AAEC4482-6CC8-4041-8D23-D01C5F81C5FE}" type="datetimeFigureOut">
               <a:rPr lang="hu-HU" smtClean="0"/>
-              <a:t>2024. 11. 28.</a:t>
+              <a:t>2024. 11. 29.</a:t>
             </a:fld>
             <a:endParaRPr lang="hu-HU"/>
           </a:p>
@@ -561,7 +563,7 @@
           <a:p>
             <a:fld id="{AEC7956B-A1E9-4E44-91C5-703ED5768F15}" type="datetimeFigureOut">
               <a:rPr lang="hu-HU" smtClean="0"/>
-              <a:t>2024. 11. 28.</a:t>
+              <a:t>2024. 11. 29.</a:t>
             </a:fld>
             <a:endParaRPr lang="hu-HU"/>
           </a:p>
@@ -873,21 +875,44 @@
           <a:lstStyle/>
           <a:p>
             <a:r>
-              <a:rPr lang="hu-HU" dirty="0" err="1"/>
-              <a:t>Todo</a:t>
+              <a:rPr lang="hu-HU" b="0" i="0" dirty="0">
+                <a:solidFill>
+                  <a:srgbClr val="1C1E21"/>
+                </a:solidFill>
+                <a:effectLst/>
+                <a:latin typeface="Segoe UI Historic" panose="020B0502040204020203" pitchFamily="34" charset="0"/>
+              </a:rPr>
+              <a:t/>
             </a:r>
+            <a:br>
+              <a:rPr lang="hu-HU" b="0" i="0" dirty="0">
+                <a:solidFill>
+                  <a:srgbClr val="1C1E21"/>
+                </a:solidFill>
+                <a:effectLst/>
+                <a:latin typeface="Segoe UI Historic" panose="020B0502040204020203" pitchFamily="34" charset="0"/>
+              </a:rPr>
+            </a:br>
             <a:r>
-              <a:rPr lang="hu-HU" dirty="0"/>
-              <a:t>: javítani, </a:t>
+              <a:rPr lang="hu-HU" b="0" i="0" dirty="0">
+                <a:solidFill>
+                  <a:srgbClr val="1C1E21"/>
+                </a:solidFill>
+                <a:effectLst/>
+                <a:latin typeface="Segoe UI Historic" panose="020B0502040204020203" pitchFamily="34" charset="0"/>
+              </a:rPr>
+              <a:t/>
             </a:r>
-            <a:r>
-              <a:rPr lang="hu-HU" dirty="0" err="1"/>
-              <a:t>bulletpoint</a:t>
-            </a:r>
-            <a:r>
-              <a:rPr lang="hu-HU" dirty="0"/>
-              <a:t>-szerűbbre, kevesebb szöveg, ízlésesebbre</a:t>
-            </a:r>
+            <a:br>
+              <a:rPr lang="hu-HU" b="0" i="0" dirty="0">
+                <a:solidFill>
+                  <a:srgbClr val="1C1E21"/>
+                </a:solidFill>
+                <a:effectLst/>
+                <a:latin typeface="Segoe UI Historic" panose="020B0502040204020203" pitchFamily="34" charset="0"/>
+              </a:rPr>
+            </a:br>
+            <a:endParaRPr lang="hu-HU" dirty="0"/>
           </a:p>
         </p:txBody>
       </p:sp>
@@ -917,7 +942,7 @@
     </p:spTree>
     <p:extLst>
       <p:ext uri="{BB962C8B-B14F-4D97-AF65-F5344CB8AC3E}">
-        <p14:creationId xmlns:p14="http://schemas.microsoft.com/office/powerpoint/2010/main" val="3783285510"/>
+        <p14:creationId xmlns:p14="http://schemas.microsoft.com/office/powerpoint/2010/main" val="2143851720"/>
       </p:ext>
     </p:extLst>
   </p:cSld>
@@ -971,10 +996,7 @@
           <a:bodyPr/>
           <a:lstStyle/>
           <a:p>
-            <a:r>
-              <a:rPr lang="hu-HU" dirty="0"/>
-              <a:t>A sitemap elmagyarázása, az app felépítése</a:t>
-            </a:r>
+            <a:endParaRPr lang="hu-HU" dirty="0"/>
           </a:p>
         </p:txBody>
       </p:sp>
@@ -1004,7 +1026,7 @@
     </p:spTree>
     <p:extLst>
       <p:ext uri="{BB962C8B-B14F-4D97-AF65-F5344CB8AC3E}">
-        <p14:creationId xmlns:p14="http://schemas.microsoft.com/office/powerpoint/2010/main" val="2002487803"/>
+        <p14:creationId xmlns:p14="http://schemas.microsoft.com/office/powerpoint/2010/main" val="3783285510"/>
       </p:ext>
     </p:extLst>
   </p:cSld>
@@ -1168,29 +1190,8 @@
           <a:p>
             <a:r>
               <a:rPr lang="hu-HU" dirty="0"/>
-              <a:t>A struktúra elmagyarázása, a Team </a:t>
+              <a:t>A sitemap elmagyarázása, az app felépítése</a:t>
             </a:r>
-            <a:r>
-              <a:rPr lang="hu-HU" dirty="0" err="1"/>
-              <a:t>table</a:t>
-            </a:r>
-            <a:r>
-              <a:rPr lang="hu-HU" dirty="0"/>
-              <a:t>-ben a </a:t>
-            </a:r>
-            <a:r>
-              <a:rPr lang="hu-HU" dirty="0" err="1"/>
-              <a:t>contestant</a:t>
-            </a:r>
-            <a:r>
-              <a:rPr lang="hu-HU" dirty="0"/>
-              <a:t> cuccok indoklása, probléma elmondása: </a:t>
-            </a:r>
-            <a:r>
-              <a:rPr lang="hu-HU" dirty="0" err="1"/>
-              <a:t>cascade</a:t>
-            </a:r>
-            <a:endParaRPr lang="hu-HU" dirty="0"/>
           </a:p>
         </p:txBody>
       </p:sp>
@@ -1220,7 +1221,7 @@
     </p:spTree>
     <p:extLst>
       <p:ext uri="{BB962C8B-B14F-4D97-AF65-F5344CB8AC3E}">
-        <p14:creationId xmlns:p14="http://schemas.microsoft.com/office/powerpoint/2010/main" val="35207828"/>
+        <p14:creationId xmlns:p14="http://schemas.microsoft.com/office/powerpoint/2010/main" val="2002487803"/>
       </p:ext>
     </p:extLst>
   </p:cSld>
@@ -1275,28 +1276,12 @@
           <a:lstStyle/>
           <a:p>
             <a:r>
-              <a:rPr lang="hu-HU" dirty="0"/>
-              <a:t>A struktúra elmagyarázása, a Team </a:t>
+              <a:rPr lang="hu-HU" dirty="0" err="1" smtClean="0"/>
+              <a:t>appok</a:t>
             </a:r>
             <a:r>
-              <a:rPr lang="hu-HU" dirty="0" err="1"/>
-              <a:t>table</a:t>
-            </a:r>
-            <a:r>
-              <a:rPr lang="hu-HU" dirty="0"/>
-              <a:t>-ben a </a:t>
-            </a:r>
-            <a:r>
-              <a:rPr lang="hu-HU" dirty="0" err="1"/>
-              <a:t>contestant</a:t>
-            </a:r>
-            <a:r>
-              <a:rPr lang="hu-HU" dirty="0"/>
-              <a:t> cuccok indoklása, probléma elmondása: </a:t>
-            </a:r>
-            <a:r>
-              <a:rPr lang="hu-HU" dirty="0" err="1"/>
-              <a:t>cascade</a:t>
+              <a:rPr lang="hu-HU" baseline="0" dirty="0" smtClean="0"/>
+              <a:t> feladati, felépítés</a:t>
             </a:r>
             <a:endParaRPr lang="hu-HU" dirty="0"/>
           </a:p>
@@ -1328,7 +1313,7 @@
     </p:spTree>
     <p:extLst>
       <p:ext uri="{BB962C8B-B14F-4D97-AF65-F5344CB8AC3E}">
-        <p14:creationId xmlns:p14="http://schemas.microsoft.com/office/powerpoint/2010/main" val="2678299977"/>
+        <p14:creationId xmlns:p14="http://schemas.microsoft.com/office/powerpoint/2010/main" val="2755730648"/>
       </p:ext>
     </p:extLst>
   </p:cSld>
@@ -1382,30 +1367,6 @@
           <a:bodyPr/>
           <a:lstStyle/>
           <a:p>
-            <a:r>
-              <a:rPr lang="hu-HU" dirty="0"/>
-              <a:t>A struktúra elmagyarázása, a Team </a:t>
-            </a:r>
-            <a:r>
-              <a:rPr lang="hu-HU" dirty="0" err="1"/>
-              <a:t>table</a:t>
-            </a:r>
-            <a:r>
-              <a:rPr lang="hu-HU" dirty="0"/>
-              <a:t>-ben a </a:t>
-            </a:r>
-            <a:r>
-              <a:rPr lang="hu-HU" dirty="0" err="1"/>
-              <a:t>contestant</a:t>
-            </a:r>
-            <a:r>
-              <a:rPr lang="hu-HU" dirty="0"/>
-              <a:t> cuccok indoklása, probléma elmondása: </a:t>
-            </a:r>
-            <a:r>
-              <a:rPr lang="hu-HU" dirty="0" err="1"/>
-              <a:t>cascade</a:t>
-            </a:r>
             <a:endParaRPr lang="hu-HU" dirty="0"/>
           </a:p>
         </p:txBody>
@@ -1436,7 +1397,7 @@
     </p:spTree>
     <p:extLst>
       <p:ext uri="{BB962C8B-B14F-4D97-AF65-F5344CB8AC3E}">
-        <p14:creationId xmlns:p14="http://schemas.microsoft.com/office/powerpoint/2010/main" val="2228377277"/>
+        <p14:creationId xmlns:p14="http://schemas.microsoft.com/office/powerpoint/2010/main" val="35207828"/>
       </p:ext>
     </p:extLst>
   </p:cSld>
@@ -1490,30 +1451,6 @@
           <a:bodyPr/>
           <a:lstStyle/>
           <a:p>
-            <a:r>
-              <a:rPr lang="hu-HU" dirty="0"/>
-              <a:t>A struktúra elmagyarázása, a Team </a:t>
-            </a:r>
-            <a:r>
-              <a:rPr lang="hu-HU" dirty="0" err="1"/>
-              <a:t>table</a:t>
-            </a:r>
-            <a:r>
-              <a:rPr lang="hu-HU" dirty="0"/>
-              <a:t>-ben a </a:t>
-            </a:r>
-            <a:r>
-              <a:rPr lang="hu-HU" dirty="0" err="1"/>
-              <a:t>contestant</a:t>
-            </a:r>
-            <a:r>
-              <a:rPr lang="hu-HU" dirty="0"/>
-              <a:t> cuccok indoklása, probléma elmondása: </a:t>
-            </a:r>
-            <a:r>
-              <a:rPr lang="hu-HU" dirty="0" err="1"/>
-              <a:t>cascade</a:t>
-            </a:r>
             <a:endParaRPr lang="hu-HU" dirty="0"/>
           </a:p>
         </p:txBody>
@@ -1544,7 +1481,91 @@
     </p:spTree>
     <p:extLst>
       <p:ext uri="{BB962C8B-B14F-4D97-AF65-F5344CB8AC3E}">
-        <p14:creationId xmlns:p14="http://schemas.microsoft.com/office/powerpoint/2010/main" val="2755730648"/>
+        <p14:creationId xmlns:p14="http://schemas.microsoft.com/office/powerpoint/2010/main" val="2678299977"/>
+      </p:ext>
+    </p:extLst>
+  </p:cSld>
+  <p:clrMapOvr>
+    <a:masterClrMapping/>
+  </p:clrMapOvr>
+</p:notes>
+</file>
+
+<file path=ppt/notesSlides/notesSlide8.xml><?xml version="1.0" encoding="utf-8"?>
+<p:notes xmlns:a="http://schemas.openxmlformats.org/drawingml/2006/main" xmlns:r="http://schemas.openxmlformats.org/officeDocument/2006/relationships" xmlns:p="http://schemas.openxmlformats.org/presentationml/2006/main">
+  <p:cSld>
+    <p:spTree>
+      <p:nvGrpSpPr>
+        <p:cNvPr id="1" name=""/>
+        <p:cNvGrpSpPr/>
+        <p:nvPr/>
+      </p:nvGrpSpPr>
+      <p:grpSpPr>
+        <a:xfrm>
+          <a:off x="0" y="0"/>
+          <a:ext cx="0" cy="0"/>
+          <a:chOff x="0" y="0"/>
+          <a:chExt cx="0" cy="0"/>
+        </a:xfrm>
+      </p:grpSpPr>
+      <p:sp>
+        <p:nvSpPr>
+          <p:cNvPr id="2" name="Diakép helye 1"/>
+          <p:cNvSpPr>
+            <a:spLocks noGrp="1" noRot="1" noChangeAspect="1"/>
+          </p:cNvSpPr>
+          <p:nvPr>
+            <p:ph type="sldImg"/>
+          </p:nvPr>
+        </p:nvSpPr>
+        <p:spPr/>
+      </p:sp>
+      <p:sp>
+        <p:nvSpPr>
+          <p:cNvPr id="3" name="Jegyzetek helye 2"/>
+          <p:cNvSpPr>
+            <a:spLocks noGrp="1"/>
+          </p:cNvSpPr>
+          <p:nvPr>
+            <p:ph type="body" idx="1"/>
+          </p:nvPr>
+        </p:nvSpPr>
+        <p:spPr/>
+        <p:txBody>
+          <a:bodyPr/>
+          <a:lstStyle/>
+          <a:p>
+            <a:endParaRPr lang="hu-HU" dirty="0"/>
+          </a:p>
+        </p:txBody>
+      </p:sp>
+      <p:sp>
+        <p:nvSpPr>
+          <p:cNvPr id="4" name="Dia számának helye 3"/>
+          <p:cNvSpPr>
+            <a:spLocks noGrp="1"/>
+          </p:cNvSpPr>
+          <p:nvPr>
+            <p:ph type="sldNum" sz="quarter" idx="5"/>
+          </p:nvPr>
+        </p:nvSpPr>
+        <p:spPr/>
+        <p:txBody>
+          <a:bodyPr/>
+          <a:lstStyle/>
+          <a:p>
+            <a:fld id="{D92A17DE-FA40-49B6-8AC1-4C94A51AEE7E}" type="slidenum">
+              <a:rPr lang="hu-HU" smtClean="0"/>
+              <a:t>8</a:t>
+            </a:fld>
+            <a:endParaRPr lang="hu-HU"/>
+          </a:p>
+        </p:txBody>
+      </p:sp>
+    </p:spTree>
+    <p:extLst>
+      <p:ext uri="{BB962C8B-B14F-4D97-AF65-F5344CB8AC3E}">
+        <p14:creationId xmlns:p14="http://schemas.microsoft.com/office/powerpoint/2010/main" val="3463013419"/>
       </p:ext>
     </p:extLst>
   </p:cSld>
@@ -11740,7 +11761,7 @@
                 <a:hlinkClick r:id="rId2">
                   <a:extLst>
                     <a:ext uri="{A12FA001-AC4F-418D-AE19-62706E023703}">
-                      <ahyp:hlinkClr xmlns:ahyp="http://schemas.microsoft.com/office/drawing/2018/hyperlinkcolor" val="tx"/>
+                      <ahyp:hlinkClr xmlns:ahyp="http://schemas.microsoft.com/office/drawing/2018/hyperlinkcolor" xmlns="" val="tx"/>
                     </a:ext>
                   </a:extLst>
                 </a:hlinkClick>
@@ -11771,7 +11792,7 @@
                 <a:hlinkClick r:id="rId3">
                   <a:extLst>
                     <a:ext uri="{A12FA001-AC4F-418D-AE19-62706E023703}">
-                      <ahyp:hlinkClr xmlns:ahyp="http://schemas.microsoft.com/office/drawing/2018/hyperlinkcolor" val="tx"/>
+                      <ahyp:hlinkClr xmlns:ahyp="http://schemas.microsoft.com/office/drawing/2018/hyperlinkcolor" xmlns="" val="tx"/>
                     </a:ext>
                   </a:extLst>
                 </a:hlinkClick>
@@ -11802,7 +11823,7 @@
                 <a:hlinkClick r:id="rId4">
                   <a:extLst>
                     <a:ext uri="{A12FA001-AC4F-418D-AE19-62706E023703}">
-                      <ahyp:hlinkClr xmlns:ahyp="http://schemas.microsoft.com/office/drawing/2018/hyperlinkcolor" val="tx"/>
+                      <ahyp:hlinkClr xmlns:ahyp="http://schemas.microsoft.com/office/drawing/2018/hyperlinkcolor" xmlns="" val="tx"/>
                     </a:ext>
                   </a:extLst>
                 </a:hlinkClick>
@@ -13162,7 +13183,7 @@
           <a:p>
             <a:fld id="{B9601981-2AC6-4D49-9A74-04A505B00AD0}" type="datetimeFigureOut">
               <a:rPr lang="hu-HU" smtClean="0"/>
-              <a:t>2024. 11. 28.</a:t>
+              <a:t>2024. 11. 29.</a:t>
             </a:fld>
             <a:endParaRPr lang="hu-HU"/>
           </a:p>
@@ -28740,7 +28761,7 @@
                 <a:hlinkClick r:id="rId2">
                   <a:extLst>
                     <a:ext uri="{A12FA001-AC4F-418D-AE19-62706E023703}">
-                      <ahyp:hlinkClr xmlns:ahyp="http://schemas.microsoft.com/office/drawing/2018/hyperlinkcolor" val="tx"/>
+                      <ahyp:hlinkClr xmlns:ahyp="http://schemas.microsoft.com/office/drawing/2018/hyperlinkcolor" xmlns="" val="tx"/>
                     </a:ext>
                   </a:extLst>
                 </a:hlinkClick>
@@ -28771,7 +28792,7 @@
                 <a:hlinkClick r:id="rId3">
                   <a:extLst>
                     <a:ext uri="{A12FA001-AC4F-418D-AE19-62706E023703}">
-                      <ahyp:hlinkClr xmlns:ahyp="http://schemas.microsoft.com/office/drawing/2018/hyperlinkcolor" val="tx"/>
+                      <ahyp:hlinkClr xmlns:ahyp="http://schemas.microsoft.com/office/drawing/2018/hyperlinkcolor" xmlns="" val="tx"/>
                     </a:ext>
                   </a:extLst>
                 </a:hlinkClick>
@@ -28802,7 +28823,7 @@
                 <a:hlinkClick r:id="rId4">
                   <a:extLst>
                     <a:ext uri="{A12FA001-AC4F-418D-AE19-62706E023703}">
-                      <ahyp:hlinkClr xmlns:ahyp="http://schemas.microsoft.com/office/drawing/2018/hyperlinkcolor" val="tx"/>
+                      <ahyp:hlinkClr xmlns:ahyp="http://schemas.microsoft.com/office/drawing/2018/hyperlinkcolor" xmlns="" val="tx"/>
                     </a:ext>
                   </a:extLst>
                 </a:hlinkClick>
@@ -29508,6 +29529,470 @@
 </file>
 
 <file path=ppt/slideLayouts/slideLayout40.xml><?xml version="1.0" encoding="utf-8"?>
+<p:sldLayout xmlns:a="http://schemas.openxmlformats.org/drawingml/2006/main" xmlns:r="http://schemas.openxmlformats.org/officeDocument/2006/relationships" xmlns:p="http://schemas.openxmlformats.org/presentationml/2006/main" matchingName="Title slide" type="title">
+  <p:cSld name="Title slide">
+    <p:spTree>
+      <p:nvGrpSpPr>
+        <p:cNvPr id="1" name="Shape 8"/>
+        <p:cNvGrpSpPr/>
+        <p:nvPr/>
+      </p:nvGrpSpPr>
+      <p:grpSpPr>
+        <a:xfrm>
+          <a:off x="0" y="0"/>
+          <a:ext cx="0" cy="0"/>
+          <a:chOff x="0" y="0"/>
+          <a:chExt cx="0" cy="0"/>
+        </a:xfrm>
+      </p:grpSpPr>
+      <p:sp>
+        <p:nvSpPr>
+          <p:cNvPr id="9" name="Google Shape;9;p2"/>
+          <p:cNvSpPr txBox="1">
+            <a:spLocks noGrp="1"/>
+          </p:cNvSpPr>
+          <p:nvPr>
+            <p:ph type="ctrTitle"/>
+          </p:nvPr>
+        </p:nvSpPr>
+        <p:spPr>
+          <a:xfrm>
+            <a:off x="2385867" y="1746633"/>
+            <a:ext cx="5531200" cy="2237200"/>
+          </a:xfrm>
+          <a:prstGeom prst="rect">
+            <a:avLst/>
+          </a:prstGeom>
+        </p:spPr>
+        <p:txBody>
+          <a:bodyPr spcFirstLastPara="1" wrap="square" lIns="91425" tIns="91425" rIns="91425" bIns="91425" anchor="t" anchorCtr="0">
+            <a:noAutofit/>
+          </a:bodyPr>
+          <a:lstStyle>
+            <a:lvl1pPr lvl="0">
+              <a:lnSpc>
+                <a:spcPct val="90000"/>
+              </a:lnSpc>
+              <a:spcBef>
+                <a:spcPts val="0"/>
+              </a:spcBef>
+              <a:spcAft>
+                <a:spcPts val="0"/>
+              </a:spcAft>
+              <a:buSzPts val="5200"/>
+              <a:buNone/>
+              <a:defRPr sz="4800"/>
+            </a:lvl1pPr>
+            <a:lvl2pPr lvl="1" algn="ctr">
+              <a:spcBef>
+                <a:spcPts val="0"/>
+              </a:spcBef>
+              <a:spcAft>
+                <a:spcPts val="0"/>
+              </a:spcAft>
+              <a:buSzPts val="5200"/>
+              <a:buNone/>
+              <a:defRPr sz="6933"/>
+            </a:lvl2pPr>
+            <a:lvl3pPr lvl="2" algn="ctr">
+              <a:spcBef>
+                <a:spcPts val="0"/>
+              </a:spcBef>
+              <a:spcAft>
+                <a:spcPts val="0"/>
+              </a:spcAft>
+              <a:buSzPts val="5200"/>
+              <a:buNone/>
+              <a:defRPr sz="6933"/>
+            </a:lvl3pPr>
+            <a:lvl4pPr lvl="3" algn="ctr">
+              <a:spcBef>
+                <a:spcPts val="0"/>
+              </a:spcBef>
+              <a:spcAft>
+                <a:spcPts val="0"/>
+              </a:spcAft>
+              <a:buSzPts val="5200"/>
+              <a:buNone/>
+              <a:defRPr sz="6933"/>
+            </a:lvl4pPr>
+            <a:lvl5pPr lvl="4" algn="ctr">
+              <a:spcBef>
+                <a:spcPts val="0"/>
+              </a:spcBef>
+              <a:spcAft>
+                <a:spcPts val="0"/>
+              </a:spcAft>
+              <a:buSzPts val="5200"/>
+              <a:buNone/>
+              <a:defRPr sz="6933"/>
+            </a:lvl5pPr>
+            <a:lvl6pPr lvl="5" algn="ctr">
+              <a:spcBef>
+                <a:spcPts val="0"/>
+              </a:spcBef>
+              <a:spcAft>
+                <a:spcPts val="0"/>
+              </a:spcAft>
+              <a:buSzPts val="5200"/>
+              <a:buNone/>
+              <a:defRPr sz="6933"/>
+            </a:lvl6pPr>
+            <a:lvl7pPr lvl="6" algn="ctr">
+              <a:spcBef>
+                <a:spcPts val="0"/>
+              </a:spcBef>
+              <a:spcAft>
+                <a:spcPts val="0"/>
+              </a:spcAft>
+              <a:buSzPts val="5200"/>
+              <a:buNone/>
+              <a:defRPr sz="6933"/>
+            </a:lvl7pPr>
+            <a:lvl8pPr lvl="7" algn="ctr">
+              <a:spcBef>
+                <a:spcPts val="0"/>
+              </a:spcBef>
+              <a:spcAft>
+                <a:spcPts val="0"/>
+              </a:spcAft>
+              <a:buSzPts val="5200"/>
+              <a:buNone/>
+              <a:defRPr sz="6933"/>
+            </a:lvl8pPr>
+            <a:lvl9pPr lvl="8" algn="ctr">
+              <a:spcBef>
+                <a:spcPts val="0"/>
+              </a:spcBef>
+              <a:spcAft>
+                <a:spcPts val="0"/>
+              </a:spcAft>
+              <a:buSzPts val="5200"/>
+              <a:buNone/>
+              <a:defRPr sz="6933"/>
+            </a:lvl9pPr>
+          </a:lstStyle>
+          <a:p>
+            <a:r>
+              <a:rPr lang="hu-HU"/>
+              <a:t>Mintacím szerkesztése</a:t>
+            </a:r>
+            <a:endParaRPr/>
+          </a:p>
+        </p:txBody>
+      </p:sp>
+      <p:sp>
+        <p:nvSpPr>
+          <p:cNvPr id="10" name="Google Shape;10;p2"/>
+          <p:cNvSpPr txBox="1">
+            <a:spLocks noGrp="1"/>
+          </p:cNvSpPr>
+          <p:nvPr>
+            <p:ph type="subTitle" idx="1"/>
+          </p:nvPr>
+        </p:nvSpPr>
+        <p:spPr>
+          <a:xfrm>
+            <a:off x="6892267" y="5029600"/>
+            <a:ext cx="4058400" cy="704800"/>
+          </a:xfrm>
+          <a:prstGeom prst="rect">
+            <a:avLst/>
+          </a:prstGeom>
+        </p:spPr>
+        <p:txBody>
+          <a:bodyPr spcFirstLastPara="1" wrap="square" lIns="91425" tIns="91425" rIns="91425" bIns="91425" anchor="ctr" anchorCtr="0">
+            <a:noAutofit/>
+          </a:bodyPr>
+          <a:lstStyle>
+            <a:lvl1pPr lvl="0">
+              <a:lnSpc>
+                <a:spcPct val="100000"/>
+              </a:lnSpc>
+              <a:spcBef>
+                <a:spcPts val="0"/>
+              </a:spcBef>
+              <a:spcAft>
+                <a:spcPts val="0"/>
+              </a:spcAft>
+              <a:buSzPts val="1200"/>
+              <a:buNone/>
+              <a:defRPr sz="2000"/>
+            </a:lvl1pPr>
+            <a:lvl2pPr lvl="1" algn="ctr">
+              <a:lnSpc>
+                <a:spcPct val="100000"/>
+              </a:lnSpc>
+              <a:spcBef>
+                <a:spcPts val="0"/>
+              </a:spcBef>
+              <a:spcAft>
+                <a:spcPts val="0"/>
+              </a:spcAft>
+              <a:buSzPts val="2800"/>
+              <a:buNone/>
+              <a:defRPr sz="3733"/>
+            </a:lvl2pPr>
+            <a:lvl3pPr lvl="2" algn="ctr">
+              <a:lnSpc>
+                <a:spcPct val="100000"/>
+              </a:lnSpc>
+              <a:spcBef>
+                <a:spcPts val="0"/>
+              </a:spcBef>
+              <a:spcAft>
+                <a:spcPts val="0"/>
+              </a:spcAft>
+              <a:buSzPts val="2800"/>
+              <a:buNone/>
+              <a:defRPr sz="3733"/>
+            </a:lvl3pPr>
+            <a:lvl4pPr lvl="3" algn="ctr">
+              <a:lnSpc>
+                <a:spcPct val="100000"/>
+              </a:lnSpc>
+              <a:spcBef>
+                <a:spcPts val="0"/>
+              </a:spcBef>
+              <a:spcAft>
+                <a:spcPts val="0"/>
+              </a:spcAft>
+              <a:buSzPts val="2800"/>
+              <a:buNone/>
+              <a:defRPr sz="3733"/>
+            </a:lvl4pPr>
+            <a:lvl5pPr lvl="4" algn="ctr">
+              <a:lnSpc>
+                <a:spcPct val="100000"/>
+              </a:lnSpc>
+              <a:spcBef>
+                <a:spcPts val="0"/>
+              </a:spcBef>
+              <a:spcAft>
+                <a:spcPts val="0"/>
+              </a:spcAft>
+              <a:buSzPts val="2800"/>
+              <a:buNone/>
+              <a:defRPr sz="3733"/>
+            </a:lvl5pPr>
+            <a:lvl6pPr lvl="5" algn="ctr">
+              <a:lnSpc>
+                <a:spcPct val="100000"/>
+              </a:lnSpc>
+              <a:spcBef>
+                <a:spcPts val="0"/>
+              </a:spcBef>
+              <a:spcAft>
+                <a:spcPts val="0"/>
+              </a:spcAft>
+              <a:buSzPts val="2800"/>
+              <a:buNone/>
+              <a:defRPr sz="3733"/>
+            </a:lvl6pPr>
+            <a:lvl7pPr lvl="6" algn="ctr">
+              <a:lnSpc>
+                <a:spcPct val="100000"/>
+              </a:lnSpc>
+              <a:spcBef>
+                <a:spcPts val="0"/>
+              </a:spcBef>
+              <a:spcAft>
+                <a:spcPts val="0"/>
+              </a:spcAft>
+              <a:buSzPts val="2800"/>
+              <a:buNone/>
+              <a:defRPr sz="3733"/>
+            </a:lvl7pPr>
+            <a:lvl8pPr lvl="7" algn="ctr">
+              <a:lnSpc>
+                <a:spcPct val="100000"/>
+              </a:lnSpc>
+              <a:spcBef>
+                <a:spcPts val="0"/>
+              </a:spcBef>
+              <a:spcAft>
+                <a:spcPts val="0"/>
+              </a:spcAft>
+              <a:buSzPts val="2800"/>
+              <a:buNone/>
+              <a:defRPr sz="3733"/>
+            </a:lvl8pPr>
+            <a:lvl9pPr lvl="8" algn="ctr">
+              <a:lnSpc>
+                <a:spcPct val="100000"/>
+              </a:lnSpc>
+              <a:spcBef>
+                <a:spcPts val="0"/>
+              </a:spcBef>
+              <a:spcAft>
+                <a:spcPts val="0"/>
+              </a:spcAft>
+              <a:buSzPts val="2800"/>
+              <a:buNone/>
+              <a:defRPr sz="3733"/>
+            </a:lvl9pPr>
+          </a:lstStyle>
+          <a:p>
+            <a:r>
+              <a:rPr lang="hu-HU"/>
+              <a:t>Kattintson ide az alcím mintájának szerkesztéséhez</a:t>
+            </a:r>
+            <a:endParaRPr/>
+          </a:p>
+        </p:txBody>
+      </p:sp>
+      <p:sp>
+        <p:nvSpPr>
+          <p:cNvPr id="11" name="Google Shape;11;p2"/>
+          <p:cNvSpPr txBox="1"/>
+          <p:nvPr/>
+        </p:nvSpPr>
+        <p:spPr>
+          <a:xfrm>
+            <a:off x="459067" y="6338245"/>
+            <a:ext cx="11304800" cy="240400"/>
+          </a:xfrm>
+          <a:prstGeom prst="rect">
+            <a:avLst/>
+          </a:prstGeom>
+          <a:noFill/>
+          <a:ln>
+            <a:noFill/>
+          </a:ln>
+        </p:spPr>
+        <p:txBody>
+          <a:bodyPr spcFirstLastPara="1" wrap="square" lIns="121900" tIns="121900" rIns="121900" bIns="121900" anchor="ctr" anchorCtr="0">
+            <a:noAutofit/>
+          </a:bodyPr>
+          <a:lstStyle/>
+          <a:p>
+            <a:pPr marL="0" lvl="0" indent="0" algn="ctr" rtl="0">
+              <a:spcBef>
+                <a:spcPts val="0"/>
+              </a:spcBef>
+              <a:spcAft>
+                <a:spcPts val="0"/>
+              </a:spcAft>
+              <a:buNone/>
+            </a:pPr>
+            <a:r>
+              <a:rPr lang="en" sz="1333">
+                <a:solidFill>
+                  <a:schemeClr val="dk1"/>
+                </a:solidFill>
+                <a:latin typeface="Source Code Pro"/>
+                <a:ea typeface="Source Code Pro"/>
+                <a:cs typeface="Source Code Pro"/>
+                <a:sym typeface="Source Code Pro"/>
+              </a:rPr>
+              <a:t>1 0 1 1   0 1 1   0 1   1 0 1 1 0 0 1   1 0   1 1 0 1 1   0 1 1   0 1   1 1 0 1 1 0   1 1 0 1 1 1   1 1 0 1 </a:t>
+            </a:r>
+            <a:endParaRPr sz="1333">
+              <a:solidFill>
+                <a:schemeClr val="dk1"/>
+              </a:solidFill>
+              <a:latin typeface="Source Code Pro"/>
+              <a:ea typeface="Source Code Pro"/>
+              <a:cs typeface="Source Code Pro"/>
+              <a:sym typeface="Source Code Pro"/>
+            </a:endParaRPr>
+          </a:p>
+        </p:txBody>
+      </p:sp>
+      <p:sp>
+        <p:nvSpPr>
+          <p:cNvPr id="12" name="Google Shape;12;p2"/>
+          <p:cNvSpPr/>
+          <p:nvPr/>
+        </p:nvSpPr>
+        <p:spPr>
+          <a:xfrm>
+            <a:off x="15433" y="0"/>
+            <a:ext cx="4064800" cy="553200"/>
+          </a:xfrm>
+          <a:prstGeom prst="rect">
+            <a:avLst/>
+          </a:prstGeom>
+          <a:solidFill>
+            <a:schemeClr val="lt1"/>
+          </a:solidFill>
+          <a:ln>
+            <a:noFill/>
+          </a:ln>
+        </p:spPr>
+        <p:txBody>
+          <a:bodyPr spcFirstLastPara="1" wrap="square" lIns="121900" tIns="121900" rIns="121900" bIns="121900" anchor="ctr" anchorCtr="0">
+            <a:noAutofit/>
+          </a:bodyPr>
+          <a:lstStyle/>
+          <a:p>
+            <a:pPr marL="0" lvl="0" indent="0" algn="l" rtl="0">
+              <a:spcBef>
+                <a:spcPts val="0"/>
+              </a:spcBef>
+              <a:spcAft>
+                <a:spcPts val="0"/>
+              </a:spcAft>
+              <a:buNone/>
+            </a:pPr>
+            <a:endParaRPr sz="2400"/>
+          </a:p>
+        </p:txBody>
+      </p:sp>
+      <p:sp>
+        <p:nvSpPr>
+          <p:cNvPr id="13" name="Google Shape;13;p2"/>
+          <p:cNvSpPr/>
+          <p:nvPr/>
+        </p:nvSpPr>
+        <p:spPr>
+          <a:xfrm>
+            <a:off x="4079067" y="0"/>
+            <a:ext cx="8112800" cy="553200"/>
+          </a:xfrm>
+          <a:prstGeom prst="rect">
+            <a:avLst/>
+          </a:prstGeom>
+          <a:solidFill>
+            <a:schemeClr val="dk2"/>
+          </a:solidFill>
+          <a:ln>
+            <a:noFill/>
+          </a:ln>
+        </p:spPr>
+        <p:txBody>
+          <a:bodyPr spcFirstLastPara="1" wrap="square" lIns="121900" tIns="121900" rIns="121900" bIns="121900" anchor="ctr" anchorCtr="0">
+            <a:noAutofit/>
+          </a:bodyPr>
+          <a:lstStyle/>
+          <a:p>
+            <a:pPr marL="0" lvl="0" indent="0" algn="l" rtl="0">
+              <a:spcBef>
+                <a:spcPts val="0"/>
+              </a:spcBef>
+              <a:spcAft>
+                <a:spcPts val="0"/>
+              </a:spcAft>
+              <a:buNone/>
+            </a:pPr>
+            <a:endParaRPr sz="2400"/>
+          </a:p>
+        </p:txBody>
+      </p:sp>
+    </p:spTree>
+    <p:extLst>
+      <p:ext uri="{BB962C8B-B14F-4D97-AF65-F5344CB8AC3E}">
+        <p14:creationId xmlns:p14="http://schemas.microsoft.com/office/powerpoint/2010/main" val="3797356201"/>
+      </p:ext>
+    </p:extLst>
+  </p:cSld>
+  <p:clrMapOvr>
+    <a:masterClrMapping/>
+  </p:clrMapOvr>
+</p:sldLayout>
+</file>
+
+<file path=ppt/slideLayouts/slideLayout41.xml><?xml version="1.0" encoding="utf-8"?>
 <p:sldLayout xmlns:a="http://schemas.openxmlformats.org/drawingml/2006/main" xmlns:r="http://schemas.openxmlformats.org/officeDocument/2006/relationships" xmlns:p="http://schemas.openxmlformats.org/presentationml/2006/main" matchingName="Blank slide" type="blank" preserve="1">
   <p:cSld name="Blank slide">
     <p:spTree>
@@ -29537,7 +30022,7 @@
 </p:sldLayout>
 </file>
 
-<file path=ppt/slideLayouts/slideLayout41.xml><?xml version="1.0" encoding="utf-8"?>
+<file path=ppt/slideLayouts/slideLayout42.xml><?xml version="1.0" encoding="utf-8"?>
 <p:sldLayout xmlns:a="http://schemas.openxmlformats.org/drawingml/2006/main" xmlns:r="http://schemas.openxmlformats.org/officeDocument/2006/relationships" xmlns:p="http://schemas.openxmlformats.org/presentationml/2006/main" matchingName="Title only" preserve="1">
   <p:cSld name="Title only">
     <p:spTree>
@@ -34814,6 +35299,7 @@
     <p:sldLayoutId id="2147483705" r:id="rId15"/>
     <p:sldLayoutId id="2147483707" r:id="rId16"/>
     <p:sldLayoutId id="2147483709" r:id="rId17"/>
+    <p:sldLayoutId id="2147483713" r:id="rId18"/>
   </p:sldLayoutIdLst>
   <p:txStyles>
     <p:titleStyle>
@@ -36720,10 +37206,10 @@
       </p:grpSpPr>
       <p:sp>
         <p:nvSpPr>
-          <p:cNvPr id="49" name="Cím 48">
+          <p:cNvPr id="2" name="Cím 1">
             <a:extLst>
               <a:ext uri="{FF2B5EF4-FFF2-40B4-BE49-F238E27FC236}">
-                <a16:creationId xmlns:a16="http://schemas.microsoft.com/office/drawing/2014/main" id="{1C88AB70-0E98-24EA-C1C8-DED38F5A3300}"/>
+                <a16:creationId xmlns:a16="http://schemas.microsoft.com/office/drawing/2014/main" id="{0238A40A-B0FA-B8C7-78E8-C79D200FC1C3}"/>
               </a:ext>
             </a:extLst>
           </p:cNvPr>
@@ -36731,7 +37217,7 @@
             <a:spLocks noGrp="1"/>
           </p:cNvSpPr>
           <p:nvPr>
-            <p:ph type="title" idx="6"/>
+            <p:ph type="ctrTitle"/>
           </p:nvPr>
         </p:nvSpPr>
         <p:spPr/>
@@ -36740,249 +37226,8 @@
           <a:lstStyle/>
           <a:p>
             <a:r>
-              <a:rPr lang="hu-HU" dirty="0"/>
-              <a:t>Konkrétabb feladatok</a:t>
-            </a:r>
-          </a:p>
-        </p:txBody>
-      </p:sp>
-      <p:sp>
-        <p:nvSpPr>
-          <p:cNvPr id="50" name="Alcím 49">
-            <a:extLst>
-              <a:ext uri="{FF2B5EF4-FFF2-40B4-BE49-F238E27FC236}">
-                <a16:creationId xmlns:a16="http://schemas.microsoft.com/office/drawing/2014/main" id="{4C8F30B1-3F6A-8801-BBD8-A280D2FF6D7A}"/>
-              </a:ext>
-            </a:extLst>
-          </p:cNvPr>
-          <p:cNvSpPr>
-            <a:spLocks noGrp="1"/>
-          </p:cNvSpPr>
-          <p:nvPr>
-            <p:ph type="subTitle" idx="7"/>
-          </p:nvPr>
-        </p:nvSpPr>
-        <p:spPr/>
-        <p:txBody>
-          <a:bodyPr/>
-          <a:lstStyle/>
-          <a:p>
-            <a:pPr>
-              <a:buFontTx/>
-              <a:buChar char="-"/>
-            </a:pPr>
-            <a:r>
-              <a:rPr lang="hu-HU" dirty="0" err="1"/>
-              <a:t>Model</a:t>
-            </a:r>
-            <a:r>
-              <a:rPr lang="hu-HU" dirty="0"/>
-              <a:t> </a:t>
-            </a:r>
-            <a:r>
-              <a:rPr lang="hu-HU" dirty="0" err="1"/>
-              <a:t>classok</a:t>
-            </a:r>
-            <a:r>
-              <a:rPr lang="hu-HU" dirty="0"/>
-              <a:t> megírása</a:t>
-            </a:r>
-          </a:p>
-          <a:p>
-            <a:pPr>
-              <a:buFontTx/>
-              <a:buChar char="-"/>
-            </a:pPr>
-            <a:r>
-              <a:rPr lang="hu-HU" dirty="0"/>
-              <a:t>Szervezői panel felépítése + statisztika</a:t>
-            </a:r>
-          </a:p>
-          <a:p>
-            <a:pPr>
-              <a:buFontTx/>
-              <a:buChar char="-"/>
-            </a:pPr>
-            <a:r>
-              <a:rPr lang="hu-HU" dirty="0" err="1"/>
-              <a:t>Template</a:t>
-            </a:r>
-            <a:r>
-              <a:rPr lang="hu-HU" dirty="0"/>
-              <a:t> felépítésének kisebb bővítése</a:t>
-            </a:r>
-          </a:p>
-          <a:p>
-            <a:pPr>
-              <a:buFontTx/>
-              <a:buChar char="-"/>
-            </a:pPr>
-            <a:r>
-              <a:rPr lang="hu-HU" dirty="0"/>
-              <a:t>Filter kijavítása (</a:t>
-            </a:r>
-            <a:r>
-              <a:rPr lang="hu-HU" dirty="0" err="1"/>
-              <a:t>Khmm</a:t>
-            </a:r>
-            <a:r>
-              <a:rPr lang="hu-HU" dirty="0"/>
-              <a:t>.. </a:t>
-            </a:r>
-            <a:r>
-              <a:rPr lang="hu-HU" dirty="0" err="1"/>
-              <a:t>Zsolti</a:t>
-            </a:r>
-            <a:r>
-              <a:rPr lang="hu-HU" dirty="0"/>
-              <a:t>)</a:t>
-            </a:r>
-          </a:p>
-          <a:p>
-            <a:pPr>
-              <a:buFontTx/>
-              <a:buChar char="-"/>
-            </a:pPr>
-            <a:r>
-              <a:rPr lang="hu-HU" dirty="0"/>
-              <a:t>2 óra eltöltése egy .</a:t>
-            </a:r>
-            <a:r>
-              <a:rPr lang="hu-HU" dirty="0" err="1"/>
-              <a:t>lower</a:t>
-            </a:r>
-            <a:r>
-              <a:rPr lang="hu-HU" dirty="0"/>
-              <a:t>() miatt</a:t>
-            </a:r>
-          </a:p>
-          <a:p>
-            <a:pPr>
-              <a:buFontTx/>
-              <a:buChar char="-"/>
-            </a:pPr>
-            <a:r>
-              <a:rPr lang="hu-HU" dirty="0" err="1"/>
-              <a:t>Controllerek</a:t>
-            </a:r>
-            <a:r>
-              <a:rPr lang="hu-HU" dirty="0"/>
-              <a:t> írása </a:t>
-            </a:r>
-            <a:r>
-              <a:rPr lang="hu-HU" dirty="0" err="1"/>
-              <a:t>route</a:t>
-            </a:r>
-            <a:r>
-              <a:rPr lang="hu-HU" dirty="0"/>
-              <a:t>-ok lekezelésére</a:t>
-            </a:r>
-          </a:p>
-          <a:p>
-            <a:pPr>
-              <a:buFontTx/>
-              <a:buChar char="-"/>
-            </a:pPr>
-            <a:r>
-              <a:rPr lang="hu-HU" dirty="0"/>
-              <a:t>Helyenként frontend, </a:t>
-            </a:r>
-            <a:r>
-              <a:rPr lang="hu-HU" dirty="0" err="1"/>
-              <a:t>reszponzivitás</a:t>
-            </a:r>
-            <a:endParaRPr lang="hu-HU" dirty="0"/>
-          </a:p>
-          <a:p>
-            <a:pPr>
-              <a:buFontTx/>
-              <a:buChar char="-"/>
-            </a:pPr>
-            <a:endParaRPr lang="hu-HU" dirty="0"/>
-          </a:p>
-        </p:txBody>
-      </p:sp>
-      <p:sp>
-        <p:nvSpPr>
-          <p:cNvPr id="51" name="Cím 50">
-            <a:extLst>
-              <a:ext uri="{FF2B5EF4-FFF2-40B4-BE49-F238E27FC236}">
-                <a16:creationId xmlns:a16="http://schemas.microsoft.com/office/drawing/2014/main" id="{ED93C5AD-9935-7150-EB24-2D20C38BD187}"/>
-              </a:ext>
-            </a:extLst>
-          </p:cNvPr>
-          <p:cNvSpPr>
-            <a:spLocks noGrp="1"/>
-          </p:cNvSpPr>
-          <p:nvPr>
-            <p:ph type="title" idx="8"/>
-          </p:nvPr>
-        </p:nvSpPr>
-        <p:spPr>
-          <a:xfrm>
-            <a:off x="611641" y="612171"/>
-            <a:ext cx="10272000" cy="763600"/>
-          </a:xfrm>
-        </p:spPr>
-        <p:txBody>
-          <a:bodyPr/>
-          <a:lstStyle/>
-          <a:p>
-            <a:r>
-              <a:rPr lang="en-US" dirty="0">
-                <a:solidFill>
-                  <a:srgbClr val="7030A0"/>
-                </a:solidFill>
-              </a:rPr>
-              <a:t>&lt;/</a:t>
-            </a:r>
-            <a:r>
-              <a:rPr lang="en-US" dirty="0">
-                <a:solidFill>
-                  <a:schemeClr val="lt2"/>
-                </a:solidFill>
-              </a:rPr>
-              <a:t> </a:t>
-            </a:r>
-            <a:r>
-              <a:rPr lang="hu-HU" dirty="0">
-                <a:solidFill>
-                  <a:schemeClr val="tx1"/>
-                </a:solidFill>
-              </a:rPr>
-              <a:t>Vegyes Leves</a:t>
-            </a:r>
-          </a:p>
-        </p:txBody>
-      </p:sp>
-      <p:sp>
-        <p:nvSpPr>
-          <p:cNvPr id="3" name="Cím 2">
-            <a:extLst>
-              <a:ext uri="{FF2B5EF4-FFF2-40B4-BE49-F238E27FC236}">
-                <a16:creationId xmlns:a16="http://schemas.microsoft.com/office/drawing/2014/main" id="{2D371E4E-2992-41E5-B173-D6D97930D3AE}"/>
-              </a:ext>
-            </a:extLst>
-          </p:cNvPr>
-          <p:cNvSpPr>
-            <a:spLocks noGrp="1"/>
-          </p:cNvSpPr>
-          <p:nvPr>
-            <p:ph type="title"/>
-          </p:nvPr>
-        </p:nvSpPr>
-        <p:spPr/>
-        <p:txBody>
-          <a:bodyPr/>
-          <a:lstStyle/>
-          <a:p>
-            <a:r>
-              <a:rPr lang="hu-HU" dirty="0"/>
-              <a:t>Titkos </a:t>
-            </a:r>
-            <a:r>
-              <a:rPr lang="hu-HU" dirty="0" err="1"/>
-              <a:t>mikkentyű</a:t>
+              <a:rPr lang="hu-HU" dirty="0" smtClean="0"/>
+              <a:t>Felépítés, struktúra</a:t>
             </a:r>
             <a:endParaRPr lang="hu-HU" dirty="0"/>
           </a:p>
@@ -36990,10 +37235,10 @@
       </p:sp>
       <p:sp>
         <p:nvSpPr>
-          <p:cNvPr id="5" name="Alcím 4">
+          <p:cNvPr id="3" name="Alcím 2">
             <a:extLst>
               <a:ext uri="{FF2B5EF4-FFF2-40B4-BE49-F238E27FC236}">
-                <a16:creationId xmlns:a16="http://schemas.microsoft.com/office/drawing/2014/main" id="{95625148-F2FA-4BBB-8E42-0097E17D7CA1}"/>
+                <a16:creationId xmlns:a16="http://schemas.microsoft.com/office/drawing/2014/main" id="{7CA3E23C-AABC-B587-F594-7FD34DCF906D}"/>
               </a:ext>
             </a:extLst>
           </p:cNvPr>
@@ -37009,37 +37254,97 @@
           <a:bodyPr/>
           <a:lstStyle/>
           <a:p>
-            <a:pPr>
-              <a:buFontTx/>
-              <a:buChar char="-"/>
-            </a:pPr>
+            <a:r>
+              <a:rPr lang="hu-HU" dirty="0" smtClean="0"/>
+              <a:t>Gál Attila </a:t>
+            </a:r>
             <a:r>
               <a:rPr lang="hu-HU" dirty="0"/>
-              <a:t>Csapat segítése</a:t>
+              <a:t>Prometheus</a:t>
             </a:r>
+            <a:endParaRPr lang="hu-HU" dirty="0"/>
           </a:p>
+        </p:txBody>
+      </p:sp>
+      <p:sp>
+        <p:nvSpPr>
+          <p:cNvPr id="4" name="Szövegdoboz 3">
+            <a:extLst>
+              <a:ext uri="{FF2B5EF4-FFF2-40B4-BE49-F238E27FC236}">
+                <a16:creationId xmlns:a16="http://schemas.microsoft.com/office/drawing/2014/main" id="{6B41F683-F9D4-3142-6CB3-2B01DF8BB397}"/>
+              </a:ext>
+            </a:extLst>
+          </p:cNvPr>
+          <p:cNvSpPr txBox="1"/>
+          <p:nvPr/>
+        </p:nvSpPr>
+        <p:spPr>
+          <a:xfrm>
+            <a:off x="80817" y="95250"/>
+            <a:ext cx="2521844" cy="400110"/>
+          </a:xfrm>
+          <a:prstGeom prst="rect">
+            <a:avLst/>
+          </a:prstGeom>
+          <a:noFill/>
+        </p:spPr>
+        <p:txBody>
+          <a:bodyPr wrap="none" rtlCol="0">
+            <a:spAutoFit/>
+          </a:bodyPr>
+          <a:lstStyle/>
           <a:p>
-            <a:pPr>
-              <a:buFontTx/>
-              <a:buChar char="-"/>
-            </a:pPr>
             <a:r>
-              <a:rPr lang="hu-HU" dirty="0"/>
-              <a:t>Egyéb feladatok ellátása</a:t>
+              <a:rPr lang="hu-HU" sz="2000" dirty="0" err="1">
+                <a:solidFill>
+                  <a:schemeClr val="tx1"/>
+                </a:solidFill>
+                <a:latin typeface="Quantico" panose="020B0604020202020204" charset="0"/>
+              </a:rPr>
+              <a:t>Dusza</a:t>
             </a:r>
-          </a:p>
-          <a:p>
-            <a:pPr>
-              <a:buFontTx/>
-              <a:buChar char="-"/>
-            </a:pPr>
             <a:r>
-              <a:rPr lang="hu-HU" dirty="0"/>
-              <a:t>Projekt bővítése</a:t>
+              <a:rPr lang="hu-HU" sz="2000" dirty="0">
+                <a:solidFill>
+                  <a:schemeClr val="tx1"/>
+                </a:solidFill>
+                <a:latin typeface="Quantico" panose="020B0604020202020204" charset="0"/>
+              </a:rPr>
+              <a:t> 2024.verseny</a:t>
             </a:r>
           </a:p>
         </p:txBody>
       </p:sp>
+    </p:spTree>
+    <p:extLst>
+      <p:ext uri="{BB962C8B-B14F-4D97-AF65-F5344CB8AC3E}">
+        <p14:creationId xmlns:p14="http://schemas.microsoft.com/office/powerpoint/2010/main" val="712032047"/>
+      </p:ext>
+    </p:extLst>
+  </p:cSld>
+  <p:clrMapOvr>
+    <a:masterClrMapping/>
+  </p:clrMapOvr>
+</p:sld>
+</file>
+
+<file path=ppt/slides/slide2.xml><?xml version="1.0" encoding="utf-8"?>
+<p:sld xmlns:a="http://schemas.openxmlformats.org/drawingml/2006/main" xmlns:r="http://schemas.openxmlformats.org/officeDocument/2006/relationships" xmlns:p="http://schemas.openxmlformats.org/presentationml/2006/main">
+  <p:cSld>
+    <p:spTree>
+      <p:nvGrpSpPr>
+        <p:cNvPr id="1" name=""/>
+        <p:cNvGrpSpPr/>
+        <p:nvPr/>
+      </p:nvGrpSpPr>
+      <p:grpSpPr>
+        <a:xfrm>
+          <a:off x="0" y="0"/>
+          <a:ext cx="0" cy="0"/>
+          <a:chOff x="0" y="0"/>
+          <a:chExt cx="0" cy="0"/>
+        </a:xfrm>
+      </p:grpSpPr>
       <p:sp>
         <p:nvSpPr>
           <p:cNvPr id="7" name="Alcím 6">
@@ -37056,76 +37361,70 @@
             <p:ph type="subTitle" idx="3"/>
           </p:nvPr>
         </p:nvSpPr>
-        <p:spPr/>
+        <p:spPr>
+          <a:xfrm>
+            <a:off x="3502334" y="2162614"/>
+            <a:ext cx="7372307" cy="2845072"/>
+          </a:xfrm>
+        </p:spPr>
         <p:txBody>
           <a:bodyPr/>
           <a:lstStyle/>
           <a:p>
             <a:pPr>
+              <a:lnSpc>
+                <a:spcPct val="250000"/>
+              </a:lnSpc>
               <a:buFontTx/>
               <a:buChar char="-"/>
             </a:pPr>
             <a:r>
-              <a:rPr lang="hu-HU" dirty="0"/>
+              <a:rPr lang="hu-HU" sz="1800" dirty="0"/>
               <a:t>Adatbázis felépítése</a:t>
             </a:r>
           </a:p>
           <a:p>
             <a:pPr>
+              <a:lnSpc>
+                <a:spcPct val="250000"/>
+              </a:lnSpc>
               <a:buFontTx/>
               <a:buChar char="-"/>
             </a:pPr>
             <a:r>
-              <a:rPr lang="hu-HU" dirty="0"/>
+              <a:rPr lang="hu-HU" sz="1800" dirty="0"/>
               <a:t>Oldalak felépítése, sitemap</a:t>
             </a:r>
           </a:p>
           <a:p>
             <a:pPr>
+              <a:lnSpc>
+                <a:spcPct val="250000"/>
+              </a:lnSpc>
               <a:buFontTx/>
               <a:buChar char="-"/>
             </a:pPr>
             <a:r>
-              <a:rPr lang="hu-HU" dirty="0"/>
-              <a:t>Csapattagokkal való kupaktanács</a:t>
+              <a:rPr lang="hu-HU" sz="1800" dirty="0" smtClean="0"/>
+              <a:t>Ha </a:t>
+            </a:r>
+            <a:r>
+              <a:rPr lang="hu-HU" sz="1800" dirty="0"/>
+              <a:t>valami alapvetően rossz, az az én hibám</a:t>
             </a:r>
           </a:p>
           <a:p>
             <a:pPr>
+              <a:lnSpc>
+                <a:spcPct val="250000"/>
+              </a:lnSpc>
               <a:buFontTx/>
               <a:buChar char="-"/>
             </a:pPr>
             <a:r>
-              <a:rPr lang="hu-HU" dirty="0"/>
-              <a:t>Ha valami alapvetően rossz, az az én hibám</a:t>
-            </a:r>
-          </a:p>
-          <a:p>
-            <a:pPr>
-              <a:buFontTx/>
-              <a:buChar char="-"/>
-            </a:pPr>
-            <a:r>
-              <a:rPr lang="hu-HU" dirty="0"/>
+              <a:rPr lang="hu-HU" sz="1800" dirty="0" smtClean="0"/>
               <a:t>Előző évi próbálkozásokból való okulás (spagetti)</a:t>
             </a:r>
-          </a:p>
-          <a:p>
-            <a:pPr>
-              <a:buFontTx/>
-              <a:buChar char="-"/>
-            </a:pPr>
-            <a:r>
-              <a:rPr lang="hu-HU" dirty="0"/>
-              <a:t>Jogosultságok és felhasználói típusok felépítése</a:t>
-            </a:r>
-          </a:p>
-          <a:p>
-            <a:pPr>
-              <a:buFontTx/>
-              <a:buChar char="-"/>
-            </a:pPr>
-            <a:endParaRPr lang="hu-HU" dirty="0"/>
           </a:p>
         </p:txBody>
       </p:sp>
@@ -37145,7 +37444,12 @@
             <p:ph type="title" idx="2"/>
           </p:nvPr>
         </p:nvSpPr>
-        <p:spPr/>
+        <p:spPr>
+          <a:xfrm>
+            <a:off x="1073188" y="1651357"/>
+            <a:ext cx="4971200" cy="541200"/>
+          </a:xfrm>
+        </p:spPr>
         <p:txBody>
           <a:bodyPr/>
           <a:lstStyle/>
@@ -37173,24 +37477,30 @@
             <p:ph type="title" idx="4"/>
           </p:nvPr>
         </p:nvSpPr>
-        <p:spPr/>
+        <p:spPr>
+          <a:xfrm>
+            <a:off x="8995567" y="5223586"/>
+            <a:ext cx="2358233" cy="541200"/>
+          </a:xfrm>
+        </p:spPr>
         <p:txBody>
           <a:bodyPr/>
           <a:lstStyle/>
           <a:p>
             <a:r>
-              <a:rPr lang="hu-HU" dirty="0"/>
-              <a:t>Tesztelés</a:t>
+              <a:rPr lang="hu-HU" dirty="0" smtClean="0"/>
+              <a:t>+ Tesztelés</a:t>
             </a:r>
+            <a:endParaRPr lang="hu-HU" dirty="0"/>
           </a:p>
         </p:txBody>
       </p:sp>
       <p:sp>
         <p:nvSpPr>
-          <p:cNvPr id="13" name="Alcím 12">
+          <p:cNvPr id="12" name="Cím 2">
             <a:extLst>
               <a:ext uri="{FF2B5EF4-FFF2-40B4-BE49-F238E27FC236}">
-                <a16:creationId xmlns:a16="http://schemas.microsoft.com/office/drawing/2014/main" id="{3EC898CD-C100-4D9D-BACD-368F2621E1AB}"/>
+                <a16:creationId xmlns:a16="http://schemas.microsoft.com/office/drawing/2014/main" id="{2D371E4E-2992-41E5-B173-D6D97930D3AE}"/>
               </a:ext>
             </a:extLst>
           </p:cNvPr>
@@ -37198,50 +37508,32 @@
             <a:spLocks noGrp="1"/>
           </p:cNvSpPr>
           <p:nvPr>
-            <p:ph type="subTitle" idx="5"/>
+            <p:ph type="title"/>
           </p:nvPr>
         </p:nvSpPr>
-        <p:spPr/>
+        <p:spPr>
+          <a:xfrm>
+            <a:off x="956467" y="640975"/>
+            <a:ext cx="4971200" cy="541200"/>
+          </a:xfrm>
+        </p:spPr>
         <p:txBody>
           <a:bodyPr/>
           <a:lstStyle/>
           <a:p>
-            <a:pPr>
-              <a:buFontTx/>
-              <a:buChar char="-"/>
-            </a:pPr>
             <a:r>
-              <a:rPr lang="hu-HU" dirty="0"/>
-              <a:t>Professzionális hibakereső</a:t>
-            </a:r>
-          </a:p>
-          <a:p>
-            <a:pPr>
-              <a:buFontTx/>
-              <a:buChar char="-"/>
-            </a:pPr>
-            <a:r>
-              <a:rPr lang="hu-HU" dirty="0"/>
-              <a:t>Emiatt órákig elakadtam ( .</a:t>
+              <a:rPr lang="hu-HU" dirty="0" smtClean="0">
+                <a:solidFill>
+                  <a:srgbClr val="7030A0"/>
+                </a:solidFill>
+              </a:rPr>
+              <a:t>&lt;/</a:t>
             </a:r>
             <a:r>
-              <a:rPr lang="hu-HU" dirty="0" err="1"/>
-              <a:t>lower</a:t>
+              <a:rPr lang="hu-HU" dirty="0" smtClean="0"/>
+              <a:t> A szerepköröm</a:t>
             </a:r>
-            <a:r>
-              <a:rPr lang="hu-HU" dirty="0"/>
-              <a:t>() )</a:t>
-            </a:r>
-          </a:p>
-          <a:p>
-            <a:pPr>
-              <a:buFontTx/>
-              <a:buChar char="-"/>
-            </a:pPr>
-            <a:r>
-              <a:rPr lang="hu-HU" dirty="0"/>
-              <a:t>+ adatbázis alapadatok létrehozása</a:t>
-            </a:r>
+            <a:endParaRPr lang="hu-HU" dirty="0"/>
           </a:p>
         </p:txBody>
       </p:sp>
@@ -37255,10 +37547,248 @@
   <p:clrMapOvr>
     <a:masterClrMapping/>
   </p:clrMapOvr>
+  <p:timing>
+    <p:tnLst>
+      <p:par>
+        <p:cTn id="1" dur="indefinite" restart="never" nodeType="tmRoot"/>
+      </p:par>
+    </p:tnLst>
+  </p:timing>
 </p:sld>
 </file>
 
-<file path=ppt/slides/slide2.xml><?xml version="1.0" encoding="utf-8"?>
+<file path=ppt/slides/slide3.xml><?xml version="1.0" encoding="utf-8"?>
+<p:sld xmlns:a="http://schemas.openxmlformats.org/drawingml/2006/main" xmlns:r="http://schemas.openxmlformats.org/officeDocument/2006/relationships" xmlns:p="http://schemas.openxmlformats.org/presentationml/2006/main">
+  <p:cSld>
+    <p:spTree>
+      <p:nvGrpSpPr>
+        <p:cNvPr id="1" name=""/>
+        <p:cNvGrpSpPr/>
+        <p:nvPr/>
+      </p:nvGrpSpPr>
+      <p:grpSpPr>
+        <a:xfrm>
+          <a:off x="0" y="0"/>
+          <a:ext cx="0" cy="0"/>
+          <a:chOff x="0" y="0"/>
+          <a:chExt cx="0" cy="0"/>
+        </a:xfrm>
+      </p:grpSpPr>
+      <p:sp>
+        <p:nvSpPr>
+          <p:cNvPr id="51" name="Cím 50">
+            <a:extLst>
+              <a:ext uri="{FF2B5EF4-FFF2-40B4-BE49-F238E27FC236}">
+                <a16:creationId xmlns:a16="http://schemas.microsoft.com/office/drawing/2014/main" id="{ED93C5AD-9935-7150-EB24-2D20C38BD187}"/>
+              </a:ext>
+            </a:extLst>
+          </p:cNvPr>
+          <p:cNvSpPr>
+            <a:spLocks noGrp="1"/>
+          </p:cNvSpPr>
+          <p:nvPr>
+            <p:ph type="title" idx="8"/>
+          </p:nvPr>
+        </p:nvSpPr>
+        <p:spPr>
+          <a:xfrm>
+            <a:off x="611641" y="602953"/>
+            <a:ext cx="10272000" cy="763600"/>
+          </a:xfrm>
+        </p:spPr>
+        <p:txBody>
+          <a:bodyPr/>
+          <a:lstStyle/>
+          <a:p>
+            <a:r>
+              <a:rPr lang="en-US" dirty="0">
+                <a:solidFill>
+                  <a:srgbClr val="7030A0"/>
+                </a:solidFill>
+              </a:rPr>
+              <a:t>&lt;/</a:t>
+            </a:r>
+            <a:r>
+              <a:rPr lang="hu-HU" dirty="0">
+                <a:solidFill>
+                  <a:srgbClr val="7030A0"/>
+                </a:solidFill>
+              </a:rPr>
+              <a:t> </a:t>
+            </a:r>
+            <a:r>
+              <a:rPr lang="hu-HU" dirty="0" smtClean="0"/>
+              <a:t>Adatbázis</a:t>
+            </a:r>
+            <a:r>
+              <a:rPr lang="hu-HU" dirty="0"/>
+              <a:t/>
+            </a:r>
+            <a:br>
+              <a:rPr lang="hu-HU" dirty="0"/>
+            </a:br>
+            <a:endParaRPr lang="hu-HU" dirty="0"/>
+          </a:p>
+        </p:txBody>
+      </p:sp>
+      <p:grpSp>
+        <p:nvGrpSpPr>
+          <p:cNvPr id="3" name="Csoportba foglalás 2"/>
+          <p:cNvGrpSpPr/>
+          <p:nvPr/>
+        </p:nvGrpSpPr>
+        <p:grpSpPr>
+          <a:xfrm>
+            <a:off x="3642804" y="377371"/>
+            <a:ext cx="7473066" cy="5784932"/>
+            <a:chOff x="3490628" y="370516"/>
+            <a:chExt cx="8256003" cy="6487484"/>
+          </a:xfrm>
+        </p:grpSpPr>
+        <p:sp>
+          <p:nvSpPr>
+            <p:cNvPr id="2" name="Téglalap 1"/>
+            <p:cNvSpPr/>
+            <p:nvPr/>
+          </p:nvSpPr>
+          <p:spPr>
+            <a:xfrm>
+              <a:off x="3490628" y="370516"/>
+              <a:ext cx="8256003" cy="6487484"/>
+            </a:xfrm>
+            <a:prstGeom prst="rect">
+              <a:avLst/>
+            </a:prstGeom>
+            <a:solidFill>
+              <a:srgbClr val="2D323C"/>
+            </a:solidFill>
+            <a:ln w="12700">
+              <a:solidFill>
+                <a:schemeClr val="accent6"/>
+              </a:solidFill>
+            </a:ln>
+          </p:spPr>
+          <p:style>
+            <a:lnRef idx="2">
+              <a:schemeClr val="accent1">
+                <a:shade val="50000"/>
+              </a:schemeClr>
+            </a:lnRef>
+            <a:fillRef idx="1">
+              <a:schemeClr val="accent1"/>
+            </a:fillRef>
+            <a:effectRef idx="0">
+              <a:schemeClr val="accent1"/>
+            </a:effectRef>
+            <a:fontRef idx="minor">
+              <a:schemeClr val="lt1"/>
+            </a:fontRef>
+          </p:style>
+          <p:txBody>
+            <a:bodyPr rtlCol="0" anchor="ctr"/>
+            <a:lstStyle/>
+            <a:p>
+              <a:pPr algn="ctr"/>
+              <a:endParaRPr lang="en-US"/>
+            </a:p>
+          </p:txBody>
+        </p:sp>
+        <p:pic>
+          <p:nvPicPr>
+            <p:cNvPr id="5" name="Kép 4">
+              <a:extLst>
+                <a:ext uri="{FF2B5EF4-FFF2-40B4-BE49-F238E27FC236}">
+                  <a16:creationId xmlns:a16="http://schemas.microsoft.com/office/drawing/2014/main" id="{FCFDC12C-224F-4A10-81CA-314A2748FA00}"/>
+                </a:ext>
+              </a:extLst>
+            </p:cNvPr>
+            <p:cNvPicPr>
+              <a:picLocks noChangeAspect="1"/>
+            </p:cNvPicPr>
+            <p:nvPr/>
+          </p:nvPicPr>
+          <p:blipFill>
+            <a:blip r:embed="rId3"/>
+            <a:stretch>
+              <a:fillRect/>
+            </a:stretch>
+          </p:blipFill>
+          <p:spPr>
+            <a:xfrm>
+              <a:off x="3513762" y="710255"/>
+              <a:ext cx="8221417" cy="6147745"/>
+            </a:xfrm>
+            <a:prstGeom prst="rect">
+              <a:avLst/>
+            </a:prstGeom>
+            <a:ln w="12700">
+              <a:solidFill>
+                <a:schemeClr val="tx1"/>
+              </a:solidFill>
+            </a:ln>
+          </p:spPr>
+        </p:pic>
+      </p:grpSp>
+      <p:sp>
+        <p:nvSpPr>
+          <p:cNvPr id="9" name="Szövegdoboz 8">
+            <a:extLst>
+              <a:ext uri="{FF2B5EF4-FFF2-40B4-BE49-F238E27FC236}">
+                <a16:creationId xmlns:a16="http://schemas.microsoft.com/office/drawing/2014/main" id="{A879E03A-7DD1-4478-BCD9-FA4AFC60D009}"/>
+              </a:ext>
+            </a:extLst>
+          </p:cNvPr>
+          <p:cNvSpPr txBox="1"/>
+          <p:nvPr/>
+        </p:nvSpPr>
+        <p:spPr>
+          <a:xfrm>
+            <a:off x="611641" y="1375771"/>
+            <a:ext cx="1920719" cy="307777"/>
+          </a:xfrm>
+          <a:prstGeom prst="rect">
+            <a:avLst/>
+          </a:prstGeom>
+          <a:noFill/>
+        </p:spPr>
+        <p:txBody>
+          <a:bodyPr wrap="none" rtlCol="0">
+            <a:spAutoFit/>
+          </a:bodyPr>
+          <a:lstStyle/>
+          <a:p>
+            <a:r>
+              <a:rPr lang="hu-HU" dirty="0">
+                <a:solidFill>
+                  <a:schemeClr val="tx1"/>
+                </a:solidFill>
+              </a:rPr>
+              <a:t>Probléma: CASCADE</a:t>
+            </a:r>
+          </a:p>
+        </p:txBody>
+      </p:sp>
+    </p:spTree>
+    <p:extLst>
+      <p:ext uri="{BB962C8B-B14F-4D97-AF65-F5344CB8AC3E}">
+        <p14:creationId xmlns:p14="http://schemas.microsoft.com/office/powerpoint/2010/main" val="1479380119"/>
+      </p:ext>
+    </p:extLst>
+  </p:cSld>
+  <p:clrMapOvr>
+    <a:masterClrMapping/>
+  </p:clrMapOvr>
+  <p:timing>
+    <p:tnLst>
+      <p:par>
+        <p:cTn id="1" dur="indefinite" restart="never" nodeType="tmRoot"/>
+      </p:par>
+    </p:tnLst>
+  </p:timing>
+</p:sld>
+</file>
+
+<file path=ppt/slides/slide4.xml><?xml version="1.0" encoding="utf-8"?>
 <p:sld xmlns:a="http://schemas.openxmlformats.org/drawingml/2006/main" xmlns:r="http://schemas.openxmlformats.org/officeDocument/2006/relationships" xmlns:p="http://schemas.openxmlformats.org/presentationml/2006/main">
   <p:cSld>
     <p:spTree>
@@ -37324,12 +37854,105 @@
           </a:p>
         </p:txBody>
       </p:sp>
+      <p:grpSp>
+        <p:nvGrpSpPr>
+          <p:cNvPr id="5" name="Csoportba foglalás 4"/>
+          <p:cNvGrpSpPr/>
+          <p:nvPr/>
+        </p:nvGrpSpPr>
+        <p:grpSpPr>
+          <a:xfrm>
+            <a:off x="1061584" y="1976388"/>
+            <a:ext cx="10963483" cy="3919761"/>
+            <a:chOff x="611641" y="1787703"/>
+            <a:chExt cx="10963483" cy="3919761"/>
+          </a:xfrm>
+        </p:grpSpPr>
+        <p:sp>
+          <p:nvSpPr>
+            <p:cNvPr id="3" name="Téglalap 2"/>
+            <p:cNvSpPr/>
+            <p:nvPr/>
+          </p:nvSpPr>
+          <p:spPr>
+            <a:xfrm>
+              <a:off x="611641" y="1787703"/>
+              <a:ext cx="10963483" cy="3919761"/>
+            </a:xfrm>
+            <a:prstGeom prst="rect">
+              <a:avLst/>
+            </a:prstGeom>
+            <a:solidFill>
+              <a:srgbClr val="2D323C"/>
+            </a:solidFill>
+            <a:ln w="12700">
+              <a:solidFill>
+                <a:schemeClr val="tx1"/>
+              </a:solidFill>
+            </a:ln>
+          </p:spPr>
+          <p:style>
+            <a:lnRef idx="2">
+              <a:schemeClr val="accent1">
+                <a:shade val="50000"/>
+              </a:schemeClr>
+            </a:lnRef>
+            <a:fillRef idx="1">
+              <a:schemeClr val="accent1"/>
+            </a:fillRef>
+            <a:effectRef idx="0">
+              <a:schemeClr val="accent1"/>
+            </a:effectRef>
+            <a:fontRef idx="minor">
+              <a:schemeClr val="lt1"/>
+            </a:fontRef>
+          </p:style>
+          <p:txBody>
+            <a:bodyPr rtlCol="0" anchor="ctr"/>
+            <a:lstStyle/>
+            <a:p>
+              <a:pPr algn="ctr"/>
+              <a:endParaRPr lang="en-US"/>
+            </a:p>
+          </p:txBody>
+        </p:sp>
+        <p:pic>
+          <p:nvPicPr>
+            <p:cNvPr id="7" name="Kép 6">
+              <a:extLst>
+                <a:ext uri="{FF2B5EF4-FFF2-40B4-BE49-F238E27FC236}">
+                  <a16:creationId xmlns:a16="http://schemas.microsoft.com/office/drawing/2014/main" id="{D6BC423F-EC43-469D-9DD9-D2BBCFBF10D0}"/>
+                </a:ext>
+              </a:extLst>
+            </p:cNvPr>
+            <p:cNvPicPr>
+              <a:picLocks noChangeAspect="1"/>
+            </p:cNvPicPr>
+            <p:nvPr/>
+          </p:nvPicPr>
+          <p:blipFill>
+            <a:blip r:embed="rId3"/>
+            <a:stretch>
+              <a:fillRect/>
+            </a:stretch>
+          </p:blipFill>
+          <p:spPr>
+            <a:xfrm>
+              <a:off x="616875" y="2059718"/>
+              <a:ext cx="10958249" cy="3647746"/>
+            </a:xfrm>
+            <a:prstGeom prst="rect">
+              <a:avLst/>
+            </a:prstGeom>
+          </p:spPr>
+        </p:pic>
+      </p:grpSp>
       <p:sp>
         <p:nvSpPr>
-          <p:cNvPr id="4" name="Cím 3">
+          <p:cNvPr id="8" name="Cím 50">
             <a:extLst>
               <a:ext uri="{FF2B5EF4-FFF2-40B4-BE49-F238E27FC236}">
-                <a16:creationId xmlns:a16="http://schemas.microsoft.com/office/drawing/2014/main" id="{D6313BE0-4C8E-45D8-8A11-9A39CDE22672}"/>
+                <a16:creationId xmlns:a16="http://schemas.microsoft.com/office/drawing/2014/main" id="{ED93C5AD-9935-7150-EB24-2D20C38BD187}"/>
               </a:ext>
             </a:extLst>
           </p:cNvPr>
@@ -37337,13 +37960,13 @@
             <a:spLocks noGrp="1"/>
           </p:cNvSpPr>
           <p:nvPr>
-            <p:ph type="title"/>
+            <p:ph type="title" idx="8"/>
           </p:nvPr>
         </p:nvSpPr>
         <p:spPr>
           <a:xfrm>
-            <a:off x="956467" y="1518518"/>
-            <a:ext cx="4971200" cy="541200"/>
+            <a:off x="9799165" y="995074"/>
+            <a:ext cx="1950130" cy="763600"/>
           </a:xfrm>
         </p:spPr>
         <p:txBody>
@@ -37351,42 +37974,21 @@
           <a:lstStyle/>
           <a:p>
             <a:r>
-              <a:rPr lang="hu-HU" dirty="0"/>
-              <a:t>Sitemap felépítése</a:t>
+              <a:rPr lang="hu-HU" dirty="0" smtClean="0">
+                <a:solidFill>
+                  <a:schemeClr val="accent6"/>
+                </a:solidFill>
+              </a:rPr>
+              <a:t>Sitemap</a:t>
             </a:r>
+            <a:endParaRPr lang="hu-HU" dirty="0">
+              <a:solidFill>
+                <a:schemeClr val="accent6"/>
+              </a:solidFill>
+            </a:endParaRPr>
           </a:p>
         </p:txBody>
       </p:sp>
-      <p:pic>
-        <p:nvPicPr>
-          <p:cNvPr id="7" name="Kép 6">
-            <a:extLst>
-              <a:ext uri="{FF2B5EF4-FFF2-40B4-BE49-F238E27FC236}">
-                <a16:creationId xmlns:a16="http://schemas.microsoft.com/office/drawing/2014/main" id="{D6BC423F-EC43-469D-9DD9-D2BBCFBF10D0}"/>
-              </a:ext>
-            </a:extLst>
-          </p:cNvPr>
-          <p:cNvPicPr>
-            <a:picLocks noChangeAspect="1"/>
-          </p:cNvPicPr>
-          <p:nvPr/>
-        </p:nvPicPr>
-        <p:blipFill>
-          <a:blip r:embed="rId3"/>
-          <a:stretch>
-            <a:fillRect/>
-          </a:stretch>
-        </p:blipFill>
-        <p:spPr>
-          <a:xfrm>
-            <a:off x="616875" y="2059718"/>
-            <a:ext cx="10958249" cy="3647746"/>
-          </a:xfrm>
-          <a:prstGeom prst="rect">
-            <a:avLst/>
-          </a:prstGeom>
-        </p:spPr>
-      </p:pic>
     </p:spTree>
     <p:extLst>
       <p:ext uri="{BB962C8B-B14F-4D97-AF65-F5344CB8AC3E}">
@@ -37397,10 +37999,17 @@
   <p:clrMapOvr>
     <a:masterClrMapping/>
   </p:clrMapOvr>
+  <p:timing>
+    <p:tnLst>
+      <p:par>
+        <p:cTn id="1" dur="indefinite" restart="never" nodeType="tmRoot"/>
+      </p:par>
+    </p:tnLst>
+  </p:timing>
 </p:sld>
 </file>
 
-<file path=ppt/slides/slide3.xml><?xml version="1.0" encoding="utf-8"?>
+<file path=ppt/slides/slide5.xml><?xml version="1.0" encoding="utf-8"?>
 <p:sld xmlns:a="http://schemas.openxmlformats.org/drawingml/2006/main" xmlns:r="http://schemas.openxmlformats.org/officeDocument/2006/relationships" xmlns:p="http://schemas.openxmlformats.org/presentationml/2006/main">
   <p:cSld>
     <p:spTree>
@@ -37417,6 +38026,56 @@
           <a:chExt cx="0" cy="0"/>
         </a:xfrm>
       </p:grpSpPr>
+      <p:sp>
+        <p:nvSpPr>
+          <p:cNvPr id="63" name="Hatszög 62"/>
+          <p:cNvSpPr/>
+          <p:nvPr/>
+        </p:nvSpPr>
+        <p:spPr>
+          <a:xfrm rot="5400000">
+            <a:off x="3729206" y="1654176"/>
+            <a:ext cx="4036868" cy="3480059"/>
+          </a:xfrm>
+          <a:prstGeom prst="hexagon">
+            <a:avLst/>
+          </a:prstGeom>
+          <a:solidFill>
+            <a:schemeClr val="bg1"/>
+          </a:solidFill>
+          <a:ln>
+            <a:solidFill>
+              <a:schemeClr val="accent3">
+                <a:lumMod val="75000"/>
+              </a:schemeClr>
+            </a:solidFill>
+          </a:ln>
+        </p:spPr>
+        <p:style>
+          <a:lnRef idx="2">
+            <a:schemeClr val="accent1">
+              <a:shade val="50000"/>
+            </a:schemeClr>
+          </a:lnRef>
+          <a:fillRef idx="1">
+            <a:schemeClr val="accent1"/>
+          </a:fillRef>
+          <a:effectRef idx="0">
+            <a:schemeClr val="accent1"/>
+          </a:effectRef>
+          <a:fontRef idx="minor">
+            <a:schemeClr val="lt1"/>
+          </a:fontRef>
+        </p:style>
+        <p:txBody>
+          <a:bodyPr rtlCol="0" anchor="ctr"/>
+          <a:lstStyle/>
+          <a:p>
+            <a:pPr algn="ctr"/>
+            <a:endParaRPr lang="en-US"/>
+          </a:p>
+        </p:txBody>
+      </p:sp>
       <p:sp>
         <p:nvSpPr>
           <p:cNvPr id="51" name="Cím 50">
@@ -37460,8 +38119,40 @@
               <a:t> </a:t>
             </a:r>
             <a:r>
+              <a:rPr lang="hu-HU" dirty="0" smtClean="0">
+                <a:solidFill>
+                  <a:schemeClr val="accent6"/>
+                </a:solidFill>
+              </a:rPr>
+              <a:t>A </a:t>
+            </a:r>
+            <a:r>
+              <a:rPr lang="hu-HU" dirty="0" err="1" smtClean="0">
+                <a:solidFill>
+                  <a:schemeClr val="accent6"/>
+                </a:solidFill>
+              </a:rPr>
+              <a:t>Django</a:t>
+            </a:r>
+            <a:r>
+              <a:rPr lang="hu-HU" dirty="0" smtClean="0">
+                <a:solidFill>
+                  <a:schemeClr val="accent6"/>
+                </a:solidFill>
+              </a:rPr>
+              <a:t> </a:t>
+            </a:r>
+            <a:r>
+              <a:rPr lang="hu-HU" dirty="0" err="1" smtClean="0">
+                <a:solidFill>
+                  <a:schemeClr val="accent6"/>
+                </a:solidFill>
+              </a:rPr>
+              <a:t>appok</a:t>
+            </a:r>
+            <a:r>
               <a:rPr lang="hu-HU" dirty="0"/>
-              <a:t>Adatbázis felépítése</a:t>
+              <a:t/>
             </a:r>
             <a:br>
               <a:rPr lang="hu-HU" dirty="0"/>
@@ -37470,52 +38161,16 @@
           </a:p>
         </p:txBody>
       </p:sp>
-      <p:pic>
-        <p:nvPicPr>
-          <p:cNvPr id="5" name="Kép 4">
-            <a:extLst>
-              <a:ext uri="{FF2B5EF4-FFF2-40B4-BE49-F238E27FC236}">
-                <a16:creationId xmlns:a16="http://schemas.microsoft.com/office/drawing/2014/main" id="{FCFDC12C-224F-4A10-81CA-314A2748FA00}"/>
-              </a:ext>
-            </a:extLst>
-          </p:cNvPr>
-          <p:cNvPicPr>
-            <a:picLocks noChangeAspect="1"/>
-          </p:cNvPicPr>
-          <p:nvPr/>
-        </p:nvPicPr>
-        <p:blipFill>
-          <a:blip r:embed="rId3"/>
-          <a:stretch>
-            <a:fillRect/>
-          </a:stretch>
-        </p:blipFill>
-        <p:spPr>
-          <a:xfrm>
-            <a:off x="4652387" y="848119"/>
-            <a:ext cx="7028455" cy="5255681"/>
-          </a:xfrm>
-          <a:prstGeom prst="rect">
-            <a:avLst/>
-          </a:prstGeom>
-        </p:spPr>
-      </p:pic>
       <p:sp>
         <p:nvSpPr>
-          <p:cNvPr id="9" name="Szövegdoboz 8">
-            <a:extLst>
-              <a:ext uri="{FF2B5EF4-FFF2-40B4-BE49-F238E27FC236}">
-                <a16:creationId xmlns:a16="http://schemas.microsoft.com/office/drawing/2014/main" id="{A879E03A-7DD1-4478-BCD9-FA4AFC60D009}"/>
-              </a:ext>
-            </a:extLst>
-          </p:cNvPr>
+          <p:cNvPr id="7" name="Szövegdoboz 6"/>
           <p:cNvSpPr txBox="1"/>
           <p:nvPr/>
         </p:nvSpPr>
         <p:spPr>
           <a:xfrm>
-            <a:off x="611641" y="1375771"/>
-            <a:ext cx="1920719" cy="307777"/>
+            <a:off x="5212874" y="974652"/>
+            <a:ext cx="1069524" cy="369332"/>
           </a:xfrm>
           <a:prstGeom prst="rect">
             <a:avLst/>
@@ -37529,202 +38184,31 @@
           <a:lstStyle/>
           <a:p>
             <a:r>
-              <a:rPr lang="hu-HU" dirty="0">
+              <a:rPr lang="hu-HU" sz="1800" dirty="0" err="1" smtClean="0">
                 <a:solidFill>
-                  <a:schemeClr val="tx1"/>
+                  <a:schemeClr val="accent6"/>
                 </a:solidFill>
               </a:rPr>
-              <a:t>Probléma: CASCADE</a:t>
+              <a:t>category</a:t>
             </a:r>
-          </a:p>
-        </p:txBody>
-      </p:sp>
-    </p:spTree>
-    <p:extLst>
-      <p:ext uri="{BB962C8B-B14F-4D97-AF65-F5344CB8AC3E}">
-        <p14:creationId xmlns:p14="http://schemas.microsoft.com/office/powerpoint/2010/main" val="1479380119"/>
-      </p:ext>
-    </p:extLst>
-  </p:cSld>
-  <p:clrMapOvr>
-    <a:masterClrMapping/>
-  </p:clrMapOvr>
-</p:sld>
-</file>
-
-<file path=ppt/slides/slide4.xml><?xml version="1.0" encoding="utf-8"?>
-<p:sld xmlns:a="http://schemas.openxmlformats.org/drawingml/2006/main" xmlns:r="http://schemas.openxmlformats.org/officeDocument/2006/relationships" xmlns:p="http://schemas.openxmlformats.org/presentationml/2006/main">
-  <p:cSld>
-    <p:spTree>
-      <p:nvGrpSpPr>
-        <p:cNvPr id="1" name=""/>
-        <p:cNvGrpSpPr/>
-        <p:nvPr/>
-      </p:nvGrpSpPr>
-      <p:grpSpPr>
-        <a:xfrm>
-          <a:off x="0" y="0"/>
-          <a:ext cx="0" cy="0"/>
-          <a:chOff x="0" y="0"/>
-          <a:chExt cx="0" cy="0"/>
-        </a:xfrm>
-      </p:grpSpPr>
-      <p:sp>
-        <p:nvSpPr>
-          <p:cNvPr id="51" name="Cím 50">
-            <a:extLst>
-              <a:ext uri="{FF2B5EF4-FFF2-40B4-BE49-F238E27FC236}">
-                <a16:creationId xmlns:a16="http://schemas.microsoft.com/office/drawing/2014/main" id="{ED93C5AD-9935-7150-EB24-2D20C38BD187}"/>
-              </a:ext>
-            </a:extLst>
-          </p:cNvPr>
-          <p:cNvSpPr>
-            <a:spLocks noGrp="1"/>
-          </p:cNvSpPr>
-          <p:nvPr>
-            <p:ph type="title" idx="8"/>
-          </p:nvPr>
-        </p:nvSpPr>
-        <p:spPr>
-          <a:xfrm>
-            <a:off x="611641" y="612171"/>
-            <a:ext cx="10272000" cy="763600"/>
-          </a:xfrm>
-        </p:spPr>
-        <p:txBody>
-          <a:bodyPr/>
-          <a:lstStyle/>
-          <a:p>
-            <a:r>
-              <a:rPr lang="en-US" dirty="0">
-                <a:solidFill>
-                  <a:srgbClr val="7030A0"/>
-                </a:solidFill>
-              </a:rPr>
-              <a:t>&lt;/</a:t>
-            </a:r>
-            <a:r>
-              <a:rPr lang="hu-HU" dirty="0">
-                <a:solidFill>
-                  <a:srgbClr val="7030A0"/>
-                </a:solidFill>
-              </a:rPr>
-              <a:t> </a:t>
-            </a:r>
-            <a:r>
-              <a:rPr lang="hu-HU" dirty="0" err="1"/>
-              <a:t>Template</a:t>
-            </a:r>
-            <a:r>
-              <a:rPr lang="hu-HU" dirty="0"/>
-              <a:t>-ek felépítése</a:t>
-            </a:r>
-            <a:br>
-              <a:rPr lang="hu-HU" dirty="0"/>
-            </a:br>
-            <a:endParaRPr lang="hu-HU" dirty="0"/>
-          </a:p>
-        </p:txBody>
-      </p:sp>
-    </p:spTree>
-    <p:extLst>
-      <p:ext uri="{BB962C8B-B14F-4D97-AF65-F5344CB8AC3E}">
-        <p14:creationId xmlns:p14="http://schemas.microsoft.com/office/powerpoint/2010/main" val="3658696268"/>
-      </p:ext>
-    </p:extLst>
-  </p:cSld>
-  <p:clrMapOvr>
-    <a:masterClrMapping/>
-  </p:clrMapOvr>
-</p:sld>
-</file>
-
-<file path=ppt/slides/slide5.xml><?xml version="1.0" encoding="utf-8"?>
-<p:sld xmlns:a="http://schemas.openxmlformats.org/drawingml/2006/main" xmlns:r="http://schemas.openxmlformats.org/officeDocument/2006/relationships" xmlns:p="http://schemas.openxmlformats.org/presentationml/2006/main">
-  <p:cSld>
-    <p:spTree>
-      <p:nvGrpSpPr>
-        <p:cNvPr id="1" name=""/>
-        <p:cNvGrpSpPr/>
-        <p:nvPr/>
-      </p:nvGrpSpPr>
-      <p:grpSpPr>
-        <a:xfrm>
-          <a:off x="0" y="0"/>
-          <a:ext cx="0" cy="0"/>
-          <a:chOff x="0" y="0"/>
-          <a:chExt cx="0" cy="0"/>
-        </a:xfrm>
-      </p:grpSpPr>
-      <p:sp>
-        <p:nvSpPr>
-          <p:cNvPr id="51" name="Cím 50">
-            <a:extLst>
-              <a:ext uri="{FF2B5EF4-FFF2-40B4-BE49-F238E27FC236}">
-                <a16:creationId xmlns:a16="http://schemas.microsoft.com/office/drawing/2014/main" id="{ED93C5AD-9935-7150-EB24-2D20C38BD187}"/>
-              </a:ext>
-            </a:extLst>
-          </p:cNvPr>
-          <p:cNvSpPr>
-            <a:spLocks noGrp="1"/>
-          </p:cNvSpPr>
-          <p:nvPr>
-            <p:ph type="title" idx="8"/>
-          </p:nvPr>
-        </p:nvSpPr>
-        <p:spPr>
-          <a:xfrm>
-            <a:off x="611641" y="612171"/>
-            <a:ext cx="10272000" cy="763600"/>
-          </a:xfrm>
-        </p:spPr>
-        <p:txBody>
-          <a:bodyPr/>
-          <a:lstStyle/>
-          <a:p>
-            <a:r>
-              <a:rPr lang="en-US" dirty="0">
-                <a:solidFill>
-                  <a:srgbClr val="7030A0"/>
-                </a:solidFill>
-              </a:rPr>
-              <a:t>&lt;/</a:t>
-            </a:r>
-            <a:r>
-              <a:rPr lang="hu-HU" dirty="0">
-                <a:solidFill>
-                  <a:srgbClr val="7030A0"/>
-                </a:solidFill>
-              </a:rPr>
-              <a:t> </a:t>
-            </a:r>
-            <a:r>
-              <a:rPr lang="hu-HU" dirty="0"/>
-              <a:t>Kategóriák kezelése</a:t>
-            </a:r>
-            <a:br>
-              <a:rPr lang="hu-HU" dirty="0"/>
-            </a:br>
-            <a:endParaRPr lang="hu-HU" dirty="0"/>
+            <a:endParaRPr lang="en-US" sz="1800" dirty="0">
+              <a:solidFill>
+                <a:schemeClr val="accent6"/>
+              </a:solidFill>
+            </a:endParaRPr>
           </a:p>
         </p:txBody>
       </p:sp>
       <p:sp>
         <p:nvSpPr>
-          <p:cNvPr id="9" name="Szövegdoboz 8">
-            <a:extLst>
-              <a:ext uri="{FF2B5EF4-FFF2-40B4-BE49-F238E27FC236}">
-                <a16:creationId xmlns:a16="http://schemas.microsoft.com/office/drawing/2014/main" id="{A879E03A-7DD1-4478-BCD9-FA4AFC60D009}"/>
-              </a:ext>
-            </a:extLst>
-          </p:cNvPr>
+          <p:cNvPr id="8" name="Szövegdoboz 7"/>
           <p:cNvSpPr txBox="1"/>
           <p:nvPr/>
         </p:nvSpPr>
         <p:spPr>
           <a:xfrm>
-            <a:off x="611641" y="1375771"/>
-            <a:ext cx="635110" cy="307777"/>
+            <a:off x="2916817" y="1942056"/>
+            <a:ext cx="1133644" cy="369332"/>
           </a:xfrm>
           <a:prstGeom prst="rect">
             <a:avLst/>
@@ -37738,20 +38222,676 @@
           <a:lstStyle/>
           <a:p>
             <a:r>
-              <a:rPr lang="hu-HU" dirty="0">
+              <a:rPr lang="hu-HU" sz="1800" dirty="0" err="1" smtClean="0">
                 <a:solidFill>
-                  <a:schemeClr val="tx1"/>
+                  <a:schemeClr val="accent6"/>
                 </a:solidFill>
               </a:rPr>
-              <a:t>AJAX</a:t>
+              <a:t>language</a:t>
             </a:r>
+            <a:endParaRPr lang="en-US" sz="1800" dirty="0">
+              <a:solidFill>
+                <a:schemeClr val="accent6"/>
+              </a:solidFill>
+            </a:endParaRPr>
           </a:p>
         </p:txBody>
       </p:sp>
+      <p:sp>
+        <p:nvSpPr>
+          <p:cNvPr id="9" name="Szövegdoboz 8"/>
+          <p:cNvSpPr txBox="1"/>
+          <p:nvPr/>
+        </p:nvSpPr>
+        <p:spPr>
+          <a:xfrm>
+            <a:off x="7549012" y="4456212"/>
+            <a:ext cx="928459" cy="369332"/>
+          </a:xfrm>
+          <a:prstGeom prst="rect">
+            <a:avLst/>
+          </a:prstGeom>
+          <a:noFill/>
+        </p:spPr>
+        <p:txBody>
+          <a:bodyPr wrap="none" rtlCol="0">
+            <a:spAutoFit/>
+          </a:bodyPr>
+          <a:lstStyle/>
+          <a:p>
+            <a:r>
+              <a:rPr lang="hu-HU" sz="1800" dirty="0" smtClean="0">
+                <a:solidFill>
+                  <a:schemeClr val="accent6"/>
+                </a:solidFill>
+              </a:rPr>
+              <a:t>contest</a:t>
+            </a:r>
+            <a:endParaRPr lang="en-US" sz="1800" dirty="0">
+              <a:solidFill>
+                <a:schemeClr val="accent6"/>
+              </a:solidFill>
+            </a:endParaRPr>
+          </a:p>
+        </p:txBody>
+      </p:sp>
+      <p:sp>
+        <p:nvSpPr>
+          <p:cNvPr id="10" name="Szövegdoboz 9"/>
+          <p:cNvSpPr txBox="1"/>
+          <p:nvPr/>
+        </p:nvSpPr>
+        <p:spPr>
+          <a:xfrm>
+            <a:off x="7426902" y="1942056"/>
+            <a:ext cx="851515" cy="369332"/>
+          </a:xfrm>
+          <a:prstGeom prst="rect">
+            <a:avLst/>
+          </a:prstGeom>
+          <a:noFill/>
+        </p:spPr>
+        <p:txBody>
+          <a:bodyPr wrap="none" rtlCol="0">
+            <a:spAutoFit/>
+          </a:bodyPr>
+          <a:lstStyle/>
+          <a:p>
+            <a:r>
+              <a:rPr lang="hu-HU" sz="1800" dirty="0" err="1" smtClean="0">
+                <a:solidFill>
+                  <a:schemeClr val="accent6"/>
+                </a:solidFill>
+              </a:rPr>
+              <a:t>school</a:t>
+            </a:r>
+            <a:endParaRPr lang="en-US" sz="1800" dirty="0">
+              <a:solidFill>
+                <a:schemeClr val="accent6"/>
+              </a:solidFill>
+            </a:endParaRPr>
+          </a:p>
+        </p:txBody>
+      </p:sp>
+      <p:sp>
+        <p:nvSpPr>
+          <p:cNvPr id="11" name="Szövegdoboz 10"/>
+          <p:cNvSpPr txBox="1"/>
+          <p:nvPr/>
+        </p:nvSpPr>
+        <p:spPr>
+          <a:xfrm>
+            <a:off x="3258784" y="4456212"/>
+            <a:ext cx="697627" cy="369332"/>
+          </a:xfrm>
+          <a:prstGeom prst="rect">
+            <a:avLst/>
+          </a:prstGeom>
+          <a:noFill/>
+        </p:spPr>
+        <p:txBody>
+          <a:bodyPr wrap="none" rtlCol="0">
+            <a:spAutoFit/>
+          </a:bodyPr>
+          <a:lstStyle/>
+          <a:p>
+            <a:r>
+              <a:rPr lang="hu-HU" sz="1800" dirty="0" smtClean="0">
+                <a:solidFill>
+                  <a:schemeClr val="accent6"/>
+                </a:solidFill>
+              </a:rPr>
+              <a:t>team</a:t>
+            </a:r>
+            <a:endParaRPr lang="en-US" sz="1800" dirty="0">
+              <a:solidFill>
+                <a:schemeClr val="accent6"/>
+              </a:solidFill>
+            </a:endParaRPr>
+          </a:p>
+        </p:txBody>
+      </p:sp>
+      <p:sp>
+        <p:nvSpPr>
+          <p:cNvPr id="12" name="Szövegdoboz 11"/>
+          <p:cNvSpPr txBox="1"/>
+          <p:nvPr/>
+        </p:nvSpPr>
+        <p:spPr>
+          <a:xfrm>
+            <a:off x="5411649" y="5412640"/>
+            <a:ext cx="671979" cy="369332"/>
+          </a:xfrm>
+          <a:prstGeom prst="rect">
+            <a:avLst/>
+          </a:prstGeom>
+          <a:noFill/>
+        </p:spPr>
+        <p:txBody>
+          <a:bodyPr wrap="none" rtlCol="0">
+            <a:spAutoFit/>
+          </a:bodyPr>
+          <a:lstStyle/>
+          <a:p>
+            <a:r>
+              <a:rPr lang="hu-HU" sz="1800" dirty="0" err="1" smtClean="0">
+                <a:solidFill>
+                  <a:schemeClr val="accent6"/>
+                </a:solidFill>
+              </a:rPr>
+              <a:t>User</a:t>
+            </a:r>
+            <a:endParaRPr lang="en-US" sz="1800" dirty="0">
+              <a:solidFill>
+                <a:schemeClr val="accent6"/>
+              </a:solidFill>
+            </a:endParaRPr>
+          </a:p>
+        </p:txBody>
+      </p:sp>
+      <p:cxnSp>
+        <p:nvCxnSpPr>
+          <p:cNvPr id="67" name="Egyenes összekötő 66"/>
+          <p:cNvCxnSpPr>
+            <a:stCxn id="63" idx="4"/>
+            <a:endCxn id="63" idx="1"/>
+          </p:cNvCxnSpPr>
+          <p:nvPr/>
+        </p:nvCxnSpPr>
+        <p:spPr>
+          <a:xfrm flipH="1">
+            <a:off x="4007612" y="2245787"/>
+            <a:ext cx="3480057" cy="2296838"/>
+          </a:xfrm>
+          <a:prstGeom prst="line">
+            <a:avLst/>
+          </a:prstGeom>
+        </p:spPr>
+        <p:style>
+          <a:lnRef idx="1">
+            <a:schemeClr val="accent1"/>
+          </a:lnRef>
+          <a:fillRef idx="0">
+            <a:schemeClr val="accent1"/>
+          </a:fillRef>
+          <a:effectRef idx="0">
+            <a:schemeClr val="accent1"/>
+          </a:effectRef>
+          <a:fontRef idx="minor">
+            <a:schemeClr val="tx1"/>
+          </a:fontRef>
+        </p:style>
+      </p:cxnSp>
+      <p:cxnSp>
+        <p:nvCxnSpPr>
+          <p:cNvPr id="73" name="Egyenes összekötő 72"/>
+          <p:cNvCxnSpPr>
+            <a:stCxn id="63" idx="3"/>
+            <a:endCxn id="63" idx="1"/>
+          </p:cNvCxnSpPr>
+          <p:nvPr/>
+        </p:nvCxnSpPr>
+        <p:spPr>
+          <a:xfrm flipH="1">
+            <a:off x="4007612" y="1375772"/>
+            <a:ext cx="1740028" cy="3166853"/>
+          </a:xfrm>
+          <a:prstGeom prst="line">
+            <a:avLst/>
+          </a:prstGeom>
+        </p:spPr>
+        <p:style>
+          <a:lnRef idx="1">
+            <a:schemeClr val="accent1"/>
+          </a:lnRef>
+          <a:fillRef idx="0">
+            <a:schemeClr val="accent1"/>
+          </a:fillRef>
+          <a:effectRef idx="0">
+            <a:schemeClr val="accent1"/>
+          </a:effectRef>
+          <a:fontRef idx="minor">
+            <a:schemeClr val="tx1"/>
+          </a:fontRef>
+        </p:style>
+      </p:cxnSp>
+      <p:cxnSp>
+        <p:nvCxnSpPr>
+          <p:cNvPr id="77" name="Egyenes összekötő 76"/>
+          <p:cNvCxnSpPr>
+            <a:stCxn id="63" idx="4"/>
+            <a:endCxn id="63" idx="2"/>
+          </p:cNvCxnSpPr>
+          <p:nvPr/>
+        </p:nvCxnSpPr>
+        <p:spPr>
+          <a:xfrm flipH="1">
+            <a:off x="4007612" y="2245787"/>
+            <a:ext cx="3480057" cy="0"/>
+          </a:xfrm>
+          <a:prstGeom prst="line">
+            <a:avLst/>
+          </a:prstGeom>
+        </p:spPr>
+        <p:style>
+          <a:lnRef idx="1">
+            <a:schemeClr val="accent1"/>
+          </a:lnRef>
+          <a:fillRef idx="0">
+            <a:schemeClr val="accent1"/>
+          </a:fillRef>
+          <a:effectRef idx="0">
+            <a:schemeClr val="accent1"/>
+          </a:effectRef>
+          <a:fontRef idx="minor">
+            <a:schemeClr val="tx1"/>
+          </a:fontRef>
+        </p:style>
+      </p:cxnSp>
+      <p:cxnSp>
+        <p:nvCxnSpPr>
+          <p:cNvPr id="79" name="Egyenes összekötő 78"/>
+          <p:cNvCxnSpPr>
+            <a:stCxn id="63" idx="4"/>
+            <a:endCxn id="63" idx="0"/>
+          </p:cNvCxnSpPr>
+          <p:nvPr/>
+        </p:nvCxnSpPr>
+        <p:spPr>
+          <a:xfrm flipH="1">
+            <a:off x="5747640" y="2245787"/>
+            <a:ext cx="1740029" cy="3166853"/>
+          </a:xfrm>
+          <a:prstGeom prst="line">
+            <a:avLst/>
+          </a:prstGeom>
+        </p:spPr>
+        <p:style>
+          <a:lnRef idx="1">
+            <a:schemeClr val="accent1"/>
+          </a:lnRef>
+          <a:fillRef idx="0">
+            <a:schemeClr val="accent1"/>
+          </a:fillRef>
+          <a:effectRef idx="0">
+            <a:schemeClr val="accent1"/>
+          </a:effectRef>
+          <a:fontRef idx="minor">
+            <a:schemeClr val="tx1"/>
+          </a:fontRef>
+        </p:style>
+      </p:cxnSp>
+      <p:cxnSp>
+        <p:nvCxnSpPr>
+          <p:cNvPr id="83" name="Egyenes összekötő 82"/>
+          <p:cNvCxnSpPr>
+            <a:stCxn id="63" idx="1"/>
+            <a:endCxn id="63" idx="5"/>
+          </p:cNvCxnSpPr>
+          <p:nvPr/>
+        </p:nvCxnSpPr>
+        <p:spPr>
+          <a:xfrm>
+            <a:off x="4007612" y="4542625"/>
+            <a:ext cx="3480057" cy="0"/>
+          </a:xfrm>
+          <a:prstGeom prst="line">
+            <a:avLst/>
+          </a:prstGeom>
+        </p:spPr>
+        <p:style>
+          <a:lnRef idx="1">
+            <a:schemeClr val="accent1"/>
+          </a:lnRef>
+          <a:fillRef idx="0">
+            <a:schemeClr val="accent1"/>
+          </a:fillRef>
+          <a:effectRef idx="0">
+            <a:schemeClr val="accent1"/>
+          </a:effectRef>
+          <a:fontRef idx="minor">
+            <a:schemeClr val="tx1"/>
+          </a:fontRef>
+        </p:style>
+      </p:cxnSp>
+      <p:sp>
+        <p:nvSpPr>
+          <p:cNvPr id="84" name="Folyamatábra: Feldolgozás 83"/>
+          <p:cNvSpPr/>
+          <p:nvPr/>
+        </p:nvSpPr>
+        <p:spPr>
+          <a:xfrm>
+            <a:off x="5006088" y="3161126"/>
+            <a:ext cx="1483098" cy="400110"/>
+          </a:xfrm>
+          <a:prstGeom prst="flowChartProcess">
+            <a:avLst/>
+          </a:prstGeom>
+          <a:solidFill>
+            <a:schemeClr val="bg1"/>
+          </a:solidFill>
+          <a:ln>
+            <a:solidFill>
+              <a:schemeClr val="tx1"/>
+            </a:solidFill>
+          </a:ln>
+        </p:spPr>
+        <p:style>
+          <a:lnRef idx="2">
+            <a:schemeClr val="accent1">
+              <a:shade val="50000"/>
+            </a:schemeClr>
+          </a:lnRef>
+          <a:fillRef idx="1">
+            <a:schemeClr val="accent1"/>
+          </a:fillRef>
+          <a:effectRef idx="0">
+            <a:schemeClr val="accent1"/>
+          </a:effectRef>
+          <a:fontRef idx="minor">
+            <a:schemeClr val="lt1"/>
+          </a:fontRef>
+        </p:style>
+        <p:txBody>
+          <a:bodyPr rtlCol="0" anchor="ctr"/>
+          <a:lstStyle/>
+          <a:p>
+            <a:pPr algn="ctr"/>
+            <a:endParaRPr lang="en-US"/>
+          </a:p>
+        </p:txBody>
+      </p:sp>
+      <p:sp>
+        <p:nvSpPr>
+          <p:cNvPr id="5" name="Szövegdoboz 4"/>
+          <p:cNvSpPr txBox="1"/>
+          <p:nvPr/>
+        </p:nvSpPr>
+        <p:spPr>
+          <a:xfrm>
+            <a:off x="5006088" y="3142523"/>
+            <a:ext cx="1483098" cy="400110"/>
+          </a:xfrm>
+          <a:prstGeom prst="rect">
+            <a:avLst/>
+          </a:prstGeom>
+          <a:noFill/>
+        </p:spPr>
+        <p:txBody>
+          <a:bodyPr wrap="none" rtlCol="0">
+            <a:spAutoFit/>
+          </a:bodyPr>
+          <a:lstStyle/>
+          <a:p>
+            <a:r>
+              <a:rPr lang="hu-HU" sz="2000" dirty="0" err="1">
+                <a:solidFill>
+                  <a:schemeClr val="tx2">
+                    <a:lumMod val="40000"/>
+                    <a:lumOff val="60000"/>
+                  </a:schemeClr>
+                </a:solidFill>
+              </a:rPr>
+              <a:t>d</a:t>
+            </a:r>
+            <a:r>
+              <a:rPr lang="hu-HU" sz="2000" dirty="0" err="1" smtClean="0">
+                <a:solidFill>
+                  <a:schemeClr val="tx2">
+                    <a:lumMod val="40000"/>
+                    <a:lumOff val="60000"/>
+                  </a:schemeClr>
+                </a:solidFill>
+              </a:rPr>
+              <a:t>usza_web</a:t>
+            </a:r>
+            <a:endParaRPr lang="en-US" dirty="0">
+              <a:solidFill>
+                <a:schemeClr val="tx2">
+                  <a:lumMod val="40000"/>
+                  <a:lumOff val="60000"/>
+                </a:schemeClr>
+              </a:solidFill>
+            </a:endParaRPr>
+          </a:p>
+        </p:txBody>
+      </p:sp>
+      <p:cxnSp>
+        <p:nvCxnSpPr>
+          <p:cNvPr id="86" name="Egyenes összekötő 85"/>
+          <p:cNvCxnSpPr>
+            <a:stCxn id="63" idx="3"/>
+          </p:cNvCxnSpPr>
+          <p:nvPr/>
+        </p:nvCxnSpPr>
+        <p:spPr>
+          <a:xfrm flipH="1">
+            <a:off x="5747637" y="1375772"/>
+            <a:ext cx="3" cy="1766751"/>
+          </a:xfrm>
+          <a:prstGeom prst="line">
+            <a:avLst/>
+          </a:prstGeom>
+        </p:spPr>
+        <p:style>
+          <a:lnRef idx="1">
+            <a:schemeClr val="accent1"/>
+          </a:lnRef>
+          <a:fillRef idx="0">
+            <a:schemeClr val="accent1"/>
+          </a:fillRef>
+          <a:effectRef idx="0">
+            <a:schemeClr val="accent1"/>
+          </a:effectRef>
+          <a:fontRef idx="minor">
+            <a:schemeClr val="tx1"/>
+          </a:fontRef>
+        </p:style>
+      </p:cxnSp>
+      <p:cxnSp>
+        <p:nvCxnSpPr>
+          <p:cNvPr id="88" name="Egyenes összekötő 87"/>
+          <p:cNvCxnSpPr>
+            <a:stCxn id="63" idx="5"/>
+            <a:endCxn id="84" idx="2"/>
+          </p:cNvCxnSpPr>
+          <p:nvPr/>
+        </p:nvCxnSpPr>
+        <p:spPr>
+          <a:xfrm flipH="1" flipV="1">
+            <a:off x="5747637" y="3561236"/>
+            <a:ext cx="1740032" cy="981389"/>
+          </a:xfrm>
+          <a:prstGeom prst="line">
+            <a:avLst/>
+          </a:prstGeom>
+        </p:spPr>
+        <p:style>
+          <a:lnRef idx="1">
+            <a:schemeClr val="accent1"/>
+          </a:lnRef>
+          <a:fillRef idx="0">
+            <a:schemeClr val="accent1"/>
+          </a:fillRef>
+          <a:effectRef idx="0">
+            <a:schemeClr val="accent1"/>
+          </a:effectRef>
+          <a:fontRef idx="minor">
+            <a:schemeClr val="tx1"/>
+          </a:fontRef>
+        </p:style>
+      </p:cxnSp>
+      <p:cxnSp>
+        <p:nvCxnSpPr>
+          <p:cNvPr id="90" name="Egyenes összekötő 89"/>
+          <p:cNvCxnSpPr>
+            <a:stCxn id="63" idx="2"/>
+          </p:cNvCxnSpPr>
+          <p:nvPr/>
+        </p:nvCxnSpPr>
+        <p:spPr>
+          <a:xfrm>
+            <a:off x="4007610" y="2259147"/>
+            <a:ext cx="914400" cy="914400"/>
+          </a:xfrm>
+          <a:prstGeom prst="line">
+            <a:avLst/>
+          </a:prstGeom>
+        </p:spPr>
+        <p:style>
+          <a:lnRef idx="1">
+            <a:schemeClr val="accent1"/>
+          </a:lnRef>
+          <a:fillRef idx="0">
+            <a:schemeClr val="accent1"/>
+          </a:fillRef>
+          <a:effectRef idx="0">
+            <a:schemeClr val="accent1"/>
+          </a:effectRef>
+          <a:fontRef idx="minor">
+            <a:schemeClr val="tx1"/>
+          </a:fontRef>
+        </p:style>
+      </p:cxnSp>
+      <p:cxnSp>
+        <p:nvCxnSpPr>
+          <p:cNvPr id="92" name="Egyenes összekötő 91"/>
+          <p:cNvCxnSpPr>
+            <a:stCxn id="63" idx="2"/>
+          </p:cNvCxnSpPr>
+          <p:nvPr/>
+        </p:nvCxnSpPr>
+        <p:spPr>
+          <a:xfrm>
+            <a:off x="4007610" y="2259147"/>
+            <a:ext cx="914400" cy="914400"/>
+          </a:xfrm>
+          <a:prstGeom prst="line">
+            <a:avLst/>
+          </a:prstGeom>
+        </p:spPr>
+        <p:style>
+          <a:lnRef idx="1">
+            <a:schemeClr val="accent1"/>
+          </a:lnRef>
+          <a:fillRef idx="0">
+            <a:schemeClr val="accent1"/>
+          </a:fillRef>
+          <a:effectRef idx="0">
+            <a:schemeClr val="accent1"/>
+          </a:effectRef>
+          <a:fontRef idx="minor">
+            <a:schemeClr val="tx1"/>
+          </a:fontRef>
+        </p:style>
+      </p:cxnSp>
+      <p:cxnSp>
+        <p:nvCxnSpPr>
+          <p:cNvPr id="94" name="Egyenes összekötő 93"/>
+          <p:cNvCxnSpPr>
+            <a:stCxn id="63" idx="2"/>
+            <a:endCxn id="63" idx="1"/>
+          </p:cNvCxnSpPr>
+          <p:nvPr/>
+        </p:nvCxnSpPr>
+        <p:spPr>
+          <a:xfrm>
+            <a:off x="4007612" y="2245787"/>
+            <a:ext cx="0" cy="2296838"/>
+          </a:xfrm>
+          <a:prstGeom prst="line">
+            <a:avLst/>
+          </a:prstGeom>
+          <a:ln w="28575"/>
+        </p:spPr>
+        <p:style>
+          <a:lnRef idx="1">
+            <a:schemeClr val="accent1"/>
+          </a:lnRef>
+          <a:fillRef idx="0">
+            <a:schemeClr val="accent1"/>
+          </a:fillRef>
+          <a:effectRef idx="0">
+            <a:schemeClr val="accent1"/>
+          </a:effectRef>
+          <a:fontRef idx="minor">
+            <a:schemeClr val="tx1"/>
+          </a:fontRef>
+        </p:style>
+      </p:cxnSp>
+      <p:cxnSp>
+        <p:nvCxnSpPr>
+          <p:cNvPr id="96" name="Egyenes összekötő 95"/>
+          <p:cNvCxnSpPr>
+            <a:stCxn id="63" idx="1"/>
+            <a:endCxn id="63" idx="0"/>
+          </p:cNvCxnSpPr>
+          <p:nvPr/>
+        </p:nvCxnSpPr>
+        <p:spPr>
+          <a:xfrm>
+            <a:off x="4007612" y="4542625"/>
+            <a:ext cx="1740028" cy="870015"/>
+          </a:xfrm>
+          <a:prstGeom prst="line">
+            <a:avLst/>
+          </a:prstGeom>
+          <a:ln w="28575"/>
+        </p:spPr>
+        <p:style>
+          <a:lnRef idx="1">
+            <a:schemeClr val="accent1"/>
+          </a:lnRef>
+          <a:fillRef idx="0">
+            <a:schemeClr val="accent1"/>
+          </a:fillRef>
+          <a:effectRef idx="0">
+            <a:schemeClr val="accent1"/>
+          </a:effectRef>
+          <a:fontRef idx="minor">
+            <a:schemeClr val="tx1"/>
+          </a:fontRef>
+        </p:style>
+      </p:cxnSp>
+      <p:cxnSp>
+        <p:nvCxnSpPr>
+          <p:cNvPr id="97" name="Egyenes összekötő 96"/>
+          <p:cNvCxnSpPr>
+            <a:stCxn id="84" idx="2"/>
+            <a:endCxn id="63" idx="0"/>
+          </p:cNvCxnSpPr>
+          <p:nvPr/>
+        </p:nvCxnSpPr>
+        <p:spPr>
+          <a:xfrm>
+            <a:off x="5747637" y="3561236"/>
+            <a:ext cx="3" cy="1851404"/>
+          </a:xfrm>
+          <a:prstGeom prst="line">
+            <a:avLst/>
+          </a:prstGeom>
+          <a:ln w="28575"/>
+        </p:spPr>
+        <p:style>
+          <a:lnRef idx="1">
+            <a:schemeClr val="accent1"/>
+          </a:lnRef>
+          <a:fillRef idx="0">
+            <a:schemeClr val="accent1"/>
+          </a:fillRef>
+          <a:effectRef idx="0">
+            <a:schemeClr val="accent1"/>
+          </a:effectRef>
+          <a:fontRef idx="minor">
+            <a:schemeClr val="tx1"/>
+          </a:fontRef>
+        </p:style>
+      </p:cxnSp>
     </p:spTree>
     <p:extLst>
       <p:ext uri="{BB962C8B-B14F-4D97-AF65-F5344CB8AC3E}">
-        <p14:creationId xmlns:p14="http://schemas.microsoft.com/office/powerpoint/2010/main" val="3713438498"/>
+        <p14:creationId xmlns:p14="http://schemas.microsoft.com/office/powerpoint/2010/main" val="763171085"/>
       </p:ext>
     </p:extLst>
   </p:cSld>
@@ -37821,16 +38961,17 @@
               <a:t> </a:t>
             </a:r>
             <a:r>
-              <a:rPr lang="hu-HU" dirty="0">
-                <a:solidFill>
-                  <a:schemeClr val="tx1"/>
-                </a:solidFill>
-              </a:rPr>
-              <a:t>Határidő kezelése</a:t>
+              <a:rPr lang="hu-HU" dirty="0" smtClean="0"/>
+              <a:t>Ide Pápa </a:t>
             </a:r>
-            <a:br>
-              <a:rPr lang="hu-HU" dirty="0"/>
-            </a:br>
+            <a:r>
+              <a:rPr lang="hu-HU" dirty="0" err="1" smtClean="0"/>
+              <a:t>permission</a:t>
+            </a:r>
+            <a:r>
+              <a:rPr lang="hu-HU" dirty="0" smtClean="0"/>
+              <a:t> gráfja</a:t>
+            </a:r>
             <a:endParaRPr lang="hu-HU" dirty="0"/>
           </a:p>
         </p:txBody>
@@ -37838,13 +38979,20 @@
     </p:spTree>
     <p:extLst>
       <p:ext uri="{BB962C8B-B14F-4D97-AF65-F5344CB8AC3E}">
-        <p14:creationId xmlns:p14="http://schemas.microsoft.com/office/powerpoint/2010/main" val="1425395755"/>
+        <p14:creationId xmlns:p14="http://schemas.microsoft.com/office/powerpoint/2010/main" val="3658696268"/>
       </p:ext>
     </p:extLst>
   </p:cSld>
   <p:clrMapOvr>
     <a:masterClrMapping/>
   </p:clrMapOvr>
+  <p:timing>
+    <p:tnLst>
+      <p:par>
+        <p:cTn id="1" dur="indefinite" restart="never" nodeType="tmRoot"/>
+      </p:par>
+    </p:tnLst>
+  </p:timing>
 </p:sld>
 </file>
 
@@ -37908,12 +39056,12 @@
               <a:t> </a:t>
             </a:r>
             <a:r>
-              <a:rPr lang="hu-HU" dirty="0">
-                <a:solidFill>
-                  <a:schemeClr val="tx1"/>
-                </a:solidFill>
-              </a:rPr>
-              <a:t>Statisztika</a:t>
+              <a:rPr lang="hu-HU" dirty="0" smtClean="0"/>
+              <a:t>Kategóriák, nyelvek </a:t>
+            </a:r>
+            <a:r>
+              <a:rPr lang="hu-HU" dirty="0"/>
+              <a:t>kezelése</a:t>
             </a:r>
             <a:br>
               <a:rPr lang="hu-HU" dirty="0"/>
@@ -37922,10 +39070,256 @@
           </a:p>
         </p:txBody>
       </p:sp>
+      <p:grpSp>
+        <p:nvGrpSpPr>
+          <p:cNvPr id="11" name="Csoportba foglalás 10"/>
+          <p:cNvGrpSpPr/>
+          <p:nvPr/>
+        </p:nvGrpSpPr>
+        <p:grpSpPr>
+          <a:xfrm>
+            <a:off x="2297415" y="1511573"/>
+            <a:ext cx="7696917" cy="4289078"/>
+            <a:chOff x="2369844" y="1587501"/>
+            <a:chExt cx="7696917" cy="4289078"/>
+          </a:xfrm>
+        </p:grpSpPr>
+        <p:sp>
+          <p:nvSpPr>
+            <p:cNvPr id="10" name="Folyamatábra: Feldolgozás 9"/>
+            <p:cNvSpPr/>
+            <p:nvPr/>
+          </p:nvSpPr>
+          <p:spPr>
+            <a:xfrm>
+              <a:off x="2369844" y="1587501"/>
+              <a:ext cx="7696917" cy="4279900"/>
+            </a:xfrm>
+            <a:prstGeom prst="flowChartProcess">
+              <a:avLst/>
+            </a:prstGeom>
+            <a:solidFill>
+              <a:schemeClr val="bg1"/>
+            </a:solidFill>
+            <a:ln w="12700">
+              <a:solidFill>
+                <a:schemeClr val="accent5"/>
+              </a:solidFill>
+            </a:ln>
+          </p:spPr>
+          <p:style>
+            <a:lnRef idx="2">
+              <a:schemeClr val="accent1">
+                <a:shade val="50000"/>
+              </a:schemeClr>
+            </a:lnRef>
+            <a:fillRef idx="1">
+              <a:schemeClr val="accent1"/>
+            </a:fillRef>
+            <a:effectRef idx="0">
+              <a:schemeClr val="accent1"/>
+            </a:effectRef>
+            <a:fontRef idx="minor">
+              <a:schemeClr val="lt1"/>
+            </a:fontRef>
+          </p:style>
+          <p:txBody>
+            <a:bodyPr rtlCol="0" anchor="ctr"/>
+            <a:lstStyle/>
+            <a:p>
+              <a:pPr algn="ctr"/>
+              <a:endParaRPr lang="en-US"/>
+            </a:p>
+          </p:txBody>
+        </p:sp>
+        <p:pic>
+          <p:nvPicPr>
+            <p:cNvPr id="7" name="Kép 6"/>
+            <p:cNvPicPr>
+              <a:picLocks noChangeAspect="1"/>
+            </p:cNvPicPr>
+            <p:nvPr/>
+          </p:nvPicPr>
+          <p:blipFill>
+            <a:blip r:embed="rId3"/>
+            <a:stretch>
+              <a:fillRect/>
+            </a:stretch>
+          </p:blipFill>
+          <p:spPr>
+            <a:xfrm>
+              <a:off x="2369845" y="1813921"/>
+              <a:ext cx="7696916" cy="4062658"/>
+            </a:xfrm>
+            <a:prstGeom prst="rect">
+              <a:avLst/>
+            </a:prstGeom>
+          </p:spPr>
+        </p:pic>
+      </p:grpSp>
     </p:spTree>
     <p:extLst>
       <p:ext uri="{BB962C8B-B14F-4D97-AF65-F5344CB8AC3E}">
-        <p14:creationId xmlns:p14="http://schemas.microsoft.com/office/powerpoint/2010/main" val="763171085"/>
+        <p14:creationId xmlns:p14="http://schemas.microsoft.com/office/powerpoint/2010/main" val="3713438498"/>
+      </p:ext>
+    </p:extLst>
+  </p:cSld>
+  <p:clrMapOvr>
+    <a:masterClrMapping/>
+  </p:clrMapOvr>
+</p:sld>
+</file>
+
+<file path=ppt/slides/slide8.xml><?xml version="1.0" encoding="utf-8"?>
+<p:sld xmlns:a="http://schemas.openxmlformats.org/drawingml/2006/main" xmlns:r="http://schemas.openxmlformats.org/officeDocument/2006/relationships" xmlns:p="http://schemas.openxmlformats.org/presentationml/2006/main">
+  <p:cSld>
+    <p:spTree>
+      <p:nvGrpSpPr>
+        <p:cNvPr id="1" name=""/>
+        <p:cNvGrpSpPr/>
+        <p:nvPr/>
+      </p:nvGrpSpPr>
+      <p:grpSpPr>
+        <a:xfrm>
+          <a:off x="0" y="0"/>
+          <a:ext cx="0" cy="0"/>
+          <a:chOff x="0" y="0"/>
+          <a:chExt cx="0" cy="0"/>
+        </a:xfrm>
+      </p:grpSpPr>
+      <p:sp>
+        <p:nvSpPr>
+          <p:cNvPr id="51" name="Cím 50">
+            <a:extLst>
+              <a:ext uri="{FF2B5EF4-FFF2-40B4-BE49-F238E27FC236}">
+                <a16:creationId xmlns:a16="http://schemas.microsoft.com/office/drawing/2014/main" id="{ED93C5AD-9935-7150-EB24-2D20C38BD187}"/>
+              </a:ext>
+            </a:extLst>
+          </p:cNvPr>
+          <p:cNvSpPr>
+            <a:spLocks noGrp="1"/>
+          </p:cNvSpPr>
+          <p:nvPr>
+            <p:ph type="title" idx="8"/>
+          </p:nvPr>
+        </p:nvSpPr>
+        <p:spPr>
+          <a:xfrm>
+            <a:off x="611641" y="612171"/>
+            <a:ext cx="10272000" cy="763600"/>
+          </a:xfrm>
+        </p:spPr>
+        <p:txBody>
+          <a:bodyPr/>
+          <a:lstStyle/>
+          <a:p>
+            <a:r>
+              <a:rPr lang="en-US" dirty="0">
+                <a:solidFill>
+                  <a:srgbClr val="7030A0"/>
+                </a:solidFill>
+              </a:rPr>
+              <a:t>&lt;/</a:t>
+            </a:r>
+            <a:r>
+              <a:rPr lang="hu-HU" dirty="0">
+                <a:solidFill>
+                  <a:srgbClr val="7030A0"/>
+                </a:solidFill>
+              </a:rPr>
+              <a:t> </a:t>
+            </a:r>
+            <a:r>
+              <a:rPr lang="hu-HU" dirty="0" smtClean="0"/>
+              <a:t>Kategóriák, nyelvek </a:t>
+            </a:r>
+            <a:r>
+              <a:rPr lang="hu-HU" dirty="0"/>
+              <a:t>kezelése</a:t>
+            </a:r>
+            <a:br>
+              <a:rPr lang="hu-HU" dirty="0"/>
+            </a:br>
+            <a:endParaRPr lang="hu-HU" dirty="0"/>
+          </a:p>
+        </p:txBody>
+      </p:sp>
+      <p:pic>
+        <p:nvPicPr>
+          <p:cNvPr id="2" name="Kép 1"/>
+          <p:cNvPicPr>
+            <a:picLocks noChangeAspect="1"/>
+          </p:cNvPicPr>
+          <p:nvPr/>
+        </p:nvPicPr>
+        <p:blipFill>
+          <a:blip r:embed="rId3"/>
+          <a:stretch>
+            <a:fillRect/>
+          </a:stretch>
+        </p:blipFill>
+        <p:spPr>
+          <a:xfrm>
+            <a:off x="3005792" y="4903616"/>
+            <a:ext cx="5944430" cy="1105054"/>
+          </a:xfrm>
+          <a:prstGeom prst="rect">
+            <a:avLst/>
+          </a:prstGeom>
+        </p:spPr>
+      </p:pic>
+      <p:pic>
+        <p:nvPicPr>
+          <p:cNvPr id="6" name="Kép 5"/>
+          <p:cNvPicPr>
+            <a:picLocks noChangeAspect="1"/>
+          </p:cNvPicPr>
+          <p:nvPr/>
+        </p:nvPicPr>
+        <p:blipFill>
+          <a:blip r:embed="rId4"/>
+          <a:stretch>
+            <a:fillRect/>
+          </a:stretch>
+        </p:blipFill>
+        <p:spPr>
+          <a:xfrm>
+            <a:off x="7960716" y="2118525"/>
+            <a:ext cx="3277057" cy="1657581"/>
+          </a:xfrm>
+          <a:prstGeom prst="rect">
+            <a:avLst/>
+          </a:prstGeom>
+        </p:spPr>
+      </p:pic>
+      <p:pic>
+        <p:nvPicPr>
+          <p:cNvPr id="8" name="Kép 7"/>
+          <p:cNvPicPr>
+            <a:picLocks noChangeAspect="1"/>
+          </p:cNvPicPr>
+          <p:nvPr/>
+        </p:nvPicPr>
+        <p:blipFill>
+          <a:blip r:embed="rId5"/>
+          <a:stretch>
+            <a:fillRect/>
+          </a:stretch>
+        </p:blipFill>
+        <p:spPr>
+          <a:xfrm>
+            <a:off x="923177" y="1269964"/>
+            <a:ext cx="6782994" cy="3553880"/>
+          </a:xfrm>
+          <a:prstGeom prst="rect">
+            <a:avLst/>
+          </a:prstGeom>
+        </p:spPr>
+      </p:pic>
+    </p:spTree>
+    <p:extLst>
+      <p:ext uri="{BB962C8B-B14F-4D97-AF65-F5344CB8AC3E}">
+        <p14:creationId xmlns:p14="http://schemas.microsoft.com/office/powerpoint/2010/main" val="2132348210"/>
       </p:ext>
     </p:extLst>
   </p:cSld>

</xml_diff>